<commit_message>
ensure TPC params satisfy probs <1 and Tm>T0
</commit_message>
<xml_diff>
--- a/presentations/GZ_3-23.pptx
+++ b/presentations/GZ_3-23.pptx
@@ -6,10 +6,19 @@
   </p:sldMasterIdLst>
   <p:sldIdLst>
     <p:sldId id="256" r:id="rId2"/>
-    <p:sldId id="258" r:id="rId3"/>
-    <p:sldId id="259" r:id="rId4"/>
-    <p:sldId id="260" r:id="rId5"/>
-    <p:sldId id="261" r:id="rId6"/>
+    <p:sldId id="262" r:id="rId3"/>
+    <p:sldId id="263" r:id="rId4"/>
+    <p:sldId id="259" r:id="rId5"/>
+    <p:sldId id="264" r:id="rId6"/>
+    <p:sldId id="265" r:id="rId7"/>
+    <p:sldId id="266" r:id="rId8"/>
+    <p:sldId id="267" r:id="rId9"/>
+    <p:sldId id="268" r:id="rId10"/>
+    <p:sldId id="269" r:id="rId11"/>
+    <p:sldId id="270" r:id="rId12"/>
+    <p:sldId id="271" r:id="rId13"/>
+    <p:sldId id="260" r:id="rId14"/>
+    <p:sldId id="261" r:id="rId15"/>
   </p:sldIdLst>
   <p:sldSz cx="12192000" cy="6858000"/>
   <p:notesSz cx="6858000" cy="9144000"/>
@@ -108,6 +117,11 @@
       </a:defRPr>
     </a:lvl9pPr>
   </p:defaultTextStyle>
+  <p:extLst>
+    <p:ext uri="{EFAFB233-063F-42B5-8137-9DF3F51BA10A}">
+      <p15:sldGuideLst xmlns:p15="http://schemas.microsoft.com/office/powerpoint/2012/main"/>
+    </p:ext>
+  </p:extLst>
 </p:presentation>
 </file>
 
@@ -258,7 +272,7 @@
           <a:p>
             <a:fld id="{E0D12414-7C15-4C95-943F-3081C675E6A4}" type="datetimeFigureOut">
               <a:rPr lang="en-US" smtClean="0"/>
-              <a:t>3/13/2023</a:t>
+              <a:t>3/21/2023</a:t>
             </a:fld>
             <a:endParaRPr lang="en-US"/>
           </a:p>
@@ -456,7 +470,7 @@
           <a:p>
             <a:fld id="{E0D12414-7C15-4C95-943F-3081C675E6A4}" type="datetimeFigureOut">
               <a:rPr lang="en-US" smtClean="0"/>
-              <a:t>3/13/2023</a:t>
+              <a:t>3/21/2023</a:t>
             </a:fld>
             <a:endParaRPr lang="en-US"/>
           </a:p>
@@ -664,7 +678,7 @@
           <a:p>
             <a:fld id="{E0D12414-7C15-4C95-943F-3081C675E6A4}" type="datetimeFigureOut">
               <a:rPr lang="en-US" smtClean="0"/>
-              <a:t>3/13/2023</a:t>
+              <a:t>3/21/2023</a:t>
             </a:fld>
             <a:endParaRPr lang="en-US"/>
           </a:p>
@@ -862,7 +876,7 @@
           <a:p>
             <a:fld id="{E0D12414-7C15-4C95-943F-3081C675E6A4}" type="datetimeFigureOut">
               <a:rPr lang="en-US" smtClean="0"/>
-              <a:t>3/13/2023</a:t>
+              <a:t>3/21/2023</a:t>
             </a:fld>
             <a:endParaRPr lang="en-US"/>
           </a:p>
@@ -1137,7 +1151,7 @@
           <a:p>
             <a:fld id="{E0D12414-7C15-4C95-943F-3081C675E6A4}" type="datetimeFigureOut">
               <a:rPr lang="en-US" smtClean="0"/>
-              <a:t>3/13/2023</a:t>
+              <a:t>3/21/2023</a:t>
             </a:fld>
             <a:endParaRPr lang="en-US"/>
           </a:p>
@@ -1402,7 +1416,7 @@
           <a:p>
             <a:fld id="{E0D12414-7C15-4C95-943F-3081C675E6A4}" type="datetimeFigureOut">
               <a:rPr lang="en-US" smtClean="0"/>
-              <a:t>3/13/2023</a:t>
+              <a:t>3/21/2023</a:t>
             </a:fld>
             <a:endParaRPr lang="en-US"/>
           </a:p>
@@ -1814,7 +1828,7 @@
           <a:p>
             <a:fld id="{E0D12414-7C15-4C95-943F-3081C675E6A4}" type="datetimeFigureOut">
               <a:rPr lang="en-US" smtClean="0"/>
-              <a:t>3/13/2023</a:t>
+              <a:t>3/21/2023</a:t>
             </a:fld>
             <a:endParaRPr lang="en-US"/>
           </a:p>
@@ -1955,7 +1969,7 @@
           <a:p>
             <a:fld id="{E0D12414-7C15-4C95-943F-3081C675E6A4}" type="datetimeFigureOut">
               <a:rPr lang="en-US" smtClean="0"/>
-              <a:t>3/13/2023</a:t>
+              <a:t>3/21/2023</a:t>
             </a:fld>
             <a:endParaRPr lang="en-US"/>
           </a:p>
@@ -2068,7 +2082,7 @@
           <a:p>
             <a:fld id="{E0D12414-7C15-4C95-943F-3081C675E6A4}" type="datetimeFigureOut">
               <a:rPr lang="en-US" smtClean="0"/>
-              <a:t>3/13/2023</a:t>
+              <a:t>3/21/2023</a:t>
             </a:fld>
             <a:endParaRPr lang="en-US"/>
           </a:p>
@@ -2379,7 +2393,7 @@
           <a:p>
             <a:fld id="{E0D12414-7C15-4C95-943F-3081C675E6A4}" type="datetimeFigureOut">
               <a:rPr lang="en-US" smtClean="0"/>
-              <a:t>3/13/2023</a:t>
+              <a:t>3/21/2023</a:t>
             </a:fld>
             <a:endParaRPr lang="en-US"/>
           </a:p>
@@ -2667,7 +2681,7 @@
           <a:p>
             <a:fld id="{E0D12414-7C15-4C95-943F-3081C675E6A4}" type="datetimeFigureOut">
               <a:rPr lang="en-US" smtClean="0"/>
-              <a:t>3/13/2023</a:t>
+              <a:t>3/21/2023</a:t>
             </a:fld>
             <a:endParaRPr lang="en-US"/>
           </a:p>
@@ -2908,7 +2922,7 @@
           <a:p>
             <a:fld id="{E0D12414-7C15-4C95-943F-3081C675E6A4}" type="datetimeFigureOut">
               <a:rPr lang="en-US" smtClean="0"/>
-              <a:t>3/13/2023</a:t>
+              <a:t>3/21/2023</a:t>
             </a:fld>
             <a:endParaRPr lang="en-US"/>
           </a:p>
@@ -3388,7 +3402,7 @@
 </p:sld>
 </file>
 
-<file path=ppt/slides/slide2.xml><?xml version="1.0" encoding="utf-8"?>
+<file path=ppt/slides/slide10.xml><?xml version="1.0" encoding="utf-8"?>
 <p:sld xmlns:a="http://schemas.openxmlformats.org/drawingml/2006/main" xmlns:r="http://schemas.openxmlformats.org/officeDocument/2006/relationships" xmlns:p="http://schemas.openxmlformats.org/presentationml/2006/main">
   <p:cSld>
     <p:spTree>
@@ -3407,10 +3421,10 @@
       </p:grpSpPr>
       <p:pic>
         <p:nvPicPr>
-          <p:cNvPr id="3" name="Picture 2">
-            <a:extLst>
-              <a:ext uri="{FF2B5EF4-FFF2-40B4-BE49-F238E27FC236}">
-                <a16:creationId xmlns:a16="http://schemas.microsoft.com/office/drawing/2014/main" id="{CFFA9947-CF51-413D-8A4D-F5CAFB6FFB8A}"/>
+          <p:cNvPr id="4" name="Picture 3">
+            <a:extLst>
+              <a:ext uri="{FF2B5EF4-FFF2-40B4-BE49-F238E27FC236}">
+                <a16:creationId xmlns:a16="http://schemas.microsoft.com/office/drawing/2014/main" id="{771AC047-6EA2-4962-8437-05B71B23862F}"/>
               </a:ext>
             </a:extLst>
           </p:cNvPr>
@@ -3433,18 +3447,1158 @@
         </p:blipFill>
         <p:spPr>
           <a:xfrm>
-            <a:off x="3404780" y="0"/>
-            <a:ext cx="5382440" cy="6858000"/>
+            <a:off x="1" y="400050"/>
+            <a:ext cx="12191997" cy="6457948"/>
           </a:xfrm>
           <a:prstGeom prst="rect">
             <a:avLst/>
           </a:prstGeom>
         </p:spPr>
       </p:pic>
+      <p:sp>
+        <p:nvSpPr>
+          <p:cNvPr id="5" name="Title 4">
+            <a:extLst>
+              <a:ext uri="{FF2B5EF4-FFF2-40B4-BE49-F238E27FC236}">
+                <a16:creationId xmlns:a16="http://schemas.microsoft.com/office/drawing/2014/main" id="{D3598150-473F-4BA0-AC49-10E90924829F}"/>
+              </a:ext>
+            </a:extLst>
+          </p:cNvPr>
+          <p:cNvSpPr>
+            <a:spLocks noGrp="1"/>
+          </p:cNvSpPr>
+          <p:nvPr>
+            <p:ph type="title"/>
+          </p:nvPr>
+        </p:nvSpPr>
+        <p:spPr>
+          <a:xfrm>
+            <a:off x="838200" y="1"/>
+            <a:ext cx="10515600" cy="400050"/>
+          </a:xfrm>
+        </p:spPr>
+        <p:txBody>
+          <a:bodyPr>
+            <a:noAutofit/>
+          </a:bodyPr>
+          <a:lstStyle/>
+          <a:p>
+            <a:pPr algn="ctr"/>
+            <a:r>
+              <a:rPr lang="en-US" sz="3200" b="1" u="sng" dirty="0"/>
+              <a:t>Step 3</a:t>
+            </a:r>
+            <a:r>
+              <a:rPr lang="en-US" sz="3200" b="1" dirty="0"/>
+              <a:t>: </a:t>
+            </a:r>
+            <a:r>
+              <a:rPr lang="en-US" sz="3200" dirty="0"/>
+              <a:t>Focal model parameter TPC curves</a:t>
+            </a:r>
+          </a:p>
+        </p:txBody>
+      </p:sp>
     </p:spTree>
     <p:extLst>
       <p:ext uri="{BB962C8B-B14F-4D97-AF65-F5344CB8AC3E}">
-        <p14:creationId xmlns:p14="http://schemas.microsoft.com/office/powerpoint/2010/main" val="49420477"/>
+        <p14:creationId xmlns:p14="http://schemas.microsoft.com/office/powerpoint/2010/main" val="1145374874"/>
+      </p:ext>
+    </p:extLst>
+  </p:cSld>
+  <p:clrMapOvr>
+    <a:masterClrMapping/>
+  </p:clrMapOvr>
+</p:sld>
+</file>
+
+<file path=ppt/slides/slide11.xml><?xml version="1.0" encoding="utf-8"?>
+<p:sld xmlns:a="http://schemas.openxmlformats.org/drawingml/2006/main" xmlns:r="http://schemas.openxmlformats.org/officeDocument/2006/relationships" xmlns:p="http://schemas.openxmlformats.org/presentationml/2006/main">
+  <p:cSld>
+    <p:spTree>
+      <p:nvGrpSpPr>
+        <p:cNvPr id="1" name=""/>
+        <p:cNvGrpSpPr/>
+        <p:nvPr/>
+      </p:nvGrpSpPr>
+      <p:grpSpPr>
+        <a:xfrm>
+          <a:off x="0" y="0"/>
+          <a:ext cx="0" cy="0"/>
+          <a:chOff x="0" y="0"/>
+          <a:chExt cx="0" cy="0"/>
+        </a:xfrm>
+      </p:grpSpPr>
+      <p:pic>
+        <p:nvPicPr>
+          <p:cNvPr id="4" name="Picture 3">
+            <a:extLst>
+              <a:ext uri="{FF2B5EF4-FFF2-40B4-BE49-F238E27FC236}">
+                <a16:creationId xmlns:a16="http://schemas.microsoft.com/office/drawing/2014/main" id="{771AC047-6EA2-4962-8437-05B71B23862F}"/>
+              </a:ext>
+            </a:extLst>
+          </p:cNvPr>
+          <p:cNvPicPr>
+            <a:picLocks noChangeAspect="1"/>
+          </p:cNvPicPr>
+          <p:nvPr/>
+        </p:nvPicPr>
+        <p:blipFill>
+          <a:blip r:embed="rId2">
+            <a:extLst>
+              <a:ext uri="{28A0092B-C50C-407E-A947-70E740481C1C}">
+                <a14:useLocalDpi xmlns:a14="http://schemas.microsoft.com/office/drawing/2010/main" val="0"/>
+              </a:ext>
+            </a:extLst>
+          </a:blip>
+          <a:stretch>
+            <a:fillRect/>
+          </a:stretch>
+        </p:blipFill>
+        <p:spPr>
+          <a:xfrm>
+            <a:off x="1" y="400050"/>
+            <a:ext cx="12191997" cy="6457948"/>
+          </a:xfrm>
+          <a:prstGeom prst="rect">
+            <a:avLst/>
+          </a:prstGeom>
+        </p:spPr>
+      </p:pic>
+      <p:sp>
+        <p:nvSpPr>
+          <p:cNvPr id="5" name="Title 4">
+            <a:extLst>
+              <a:ext uri="{FF2B5EF4-FFF2-40B4-BE49-F238E27FC236}">
+                <a16:creationId xmlns:a16="http://schemas.microsoft.com/office/drawing/2014/main" id="{D3598150-473F-4BA0-AC49-10E90924829F}"/>
+              </a:ext>
+            </a:extLst>
+          </p:cNvPr>
+          <p:cNvSpPr>
+            <a:spLocks noGrp="1"/>
+          </p:cNvSpPr>
+          <p:nvPr>
+            <p:ph type="title"/>
+          </p:nvPr>
+        </p:nvSpPr>
+        <p:spPr>
+          <a:xfrm>
+            <a:off x="838200" y="1"/>
+            <a:ext cx="10515600" cy="400050"/>
+          </a:xfrm>
+        </p:spPr>
+        <p:txBody>
+          <a:bodyPr>
+            <a:noAutofit/>
+          </a:bodyPr>
+          <a:lstStyle/>
+          <a:p>
+            <a:pPr algn="ctr"/>
+            <a:r>
+              <a:rPr lang="en-US" sz="3200" b="1" u="sng" dirty="0"/>
+              <a:t>Step 4</a:t>
+            </a:r>
+            <a:r>
+              <a:rPr lang="en-US" sz="3200" b="1" dirty="0"/>
+              <a:t>: </a:t>
+            </a:r>
+            <a:r>
+              <a:rPr lang="en-US" sz="3200" dirty="0"/>
+              <a:t>Incorporate other axes of variation</a:t>
+            </a:r>
+          </a:p>
+        </p:txBody>
+      </p:sp>
+    </p:spTree>
+    <p:extLst>
+      <p:ext uri="{BB962C8B-B14F-4D97-AF65-F5344CB8AC3E}">
+        <p14:creationId xmlns:p14="http://schemas.microsoft.com/office/powerpoint/2010/main" val="1076917919"/>
+      </p:ext>
+    </p:extLst>
+  </p:cSld>
+  <p:clrMapOvr>
+    <a:masterClrMapping/>
+  </p:clrMapOvr>
+</p:sld>
+</file>
+
+<file path=ppt/slides/slide12.xml><?xml version="1.0" encoding="utf-8"?>
+<p:sld xmlns:a="http://schemas.openxmlformats.org/drawingml/2006/main" xmlns:r="http://schemas.openxmlformats.org/officeDocument/2006/relationships" xmlns:p="http://schemas.openxmlformats.org/presentationml/2006/main">
+  <p:cSld>
+    <p:spTree>
+      <p:nvGrpSpPr>
+        <p:cNvPr id="1" name=""/>
+        <p:cNvGrpSpPr/>
+        <p:nvPr/>
+      </p:nvGrpSpPr>
+      <p:grpSpPr>
+        <a:xfrm>
+          <a:off x="0" y="0"/>
+          <a:ext cx="0" cy="0"/>
+          <a:chOff x="0" y="0"/>
+          <a:chExt cx="0" cy="0"/>
+        </a:xfrm>
+      </p:grpSpPr>
+      <p:pic>
+        <p:nvPicPr>
+          <p:cNvPr id="4" name="Picture 3">
+            <a:extLst>
+              <a:ext uri="{FF2B5EF4-FFF2-40B4-BE49-F238E27FC236}">
+                <a16:creationId xmlns:a16="http://schemas.microsoft.com/office/drawing/2014/main" id="{771AC047-6EA2-4962-8437-05B71B23862F}"/>
+              </a:ext>
+            </a:extLst>
+          </p:cNvPr>
+          <p:cNvPicPr>
+            <a:picLocks noChangeAspect="1"/>
+          </p:cNvPicPr>
+          <p:nvPr/>
+        </p:nvPicPr>
+        <p:blipFill>
+          <a:blip r:embed="rId2">
+            <a:extLst>
+              <a:ext uri="{28A0092B-C50C-407E-A947-70E740481C1C}">
+                <a14:useLocalDpi xmlns:a14="http://schemas.microsoft.com/office/drawing/2010/main" val="0"/>
+              </a:ext>
+            </a:extLst>
+          </a:blip>
+          <a:stretch>
+            <a:fillRect/>
+          </a:stretch>
+        </p:blipFill>
+        <p:spPr>
+          <a:xfrm>
+            <a:off x="1" y="400050"/>
+            <a:ext cx="12191997" cy="6457948"/>
+          </a:xfrm>
+          <a:prstGeom prst="rect">
+            <a:avLst/>
+          </a:prstGeom>
+        </p:spPr>
+      </p:pic>
+      <p:sp>
+        <p:nvSpPr>
+          <p:cNvPr id="5" name="Title 4">
+            <a:extLst>
+              <a:ext uri="{FF2B5EF4-FFF2-40B4-BE49-F238E27FC236}">
+                <a16:creationId xmlns:a16="http://schemas.microsoft.com/office/drawing/2014/main" id="{D3598150-473F-4BA0-AC49-10E90924829F}"/>
+              </a:ext>
+            </a:extLst>
+          </p:cNvPr>
+          <p:cNvSpPr>
+            <a:spLocks noGrp="1"/>
+          </p:cNvSpPr>
+          <p:nvPr>
+            <p:ph type="title"/>
+          </p:nvPr>
+        </p:nvSpPr>
+        <p:spPr>
+          <a:xfrm>
+            <a:off x="838200" y="1"/>
+            <a:ext cx="10515600" cy="400050"/>
+          </a:xfrm>
+        </p:spPr>
+        <p:txBody>
+          <a:bodyPr>
+            <a:noAutofit/>
+          </a:bodyPr>
+          <a:lstStyle/>
+          <a:p>
+            <a:pPr algn="ctr"/>
+            <a:r>
+              <a:rPr lang="en-US" sz="3200" b="1" u="sng" dirty="0"/>
+              <a:t>Step 5</a:t>
+            </a:r>
+            <a:r>
+              <a:rPr lang="en-US" sz="3200" b="1" dirty="0"/>
+              <a:t>: </a:t>
+            </a:r>
+            <a:r>
+              <a:rPr lang="en-US" sz="3200" dirty="0"/>
+              <a:t>Calculate and analyze transmission potential</a:t>
+            </a:r>
+          </a:p>
+        </p:txBody>
+      </p:sp>
+    </p:spTree>
+    <p:extLst>
+      <p:ext uri="{BB962C8B-B14F-4D97-AF65-F5344CB8AC3E}">
+        <p14:creationId xmlns:p14="http://schemas.microsoft.com/office/powerpoint/2010/main" val="3242041414"/>
+      </p:ext>
+    </p:extLst>
+  </p:cSld>
+  <p:clrMapOvr>
+    <a:masterClrMapping/>
+  </p:clrMapOvr>
+</p:sld>
+</file>
+
+<file path=ppt/slides/slide13.xml><?xml version="1.0" encoding="utf-8"?>
+<p:sld xmlns:a="http://schemas.openxmlformats.org/drawingml/2006/main" xmlns:r="http://schemas.openxmlformats.org/officeDocument/2006/relationships" xmlns:p="http://schemas.openxmlformats.org/presentationml/2006/main">
+  <p:cSld>
+    <p:spTree>
+      <p:nvGrpSpPr>
+        <p:cNvPr id="1" name=""/>
+        <p:cNvGrpSpPr/>
+        <p:nvPr/>
+      </p:nvGrpSpPr>
+      <p:grpSpPr>
+        <a:xfrm>
+          <a:off x="0" y="0"/>
+          <a:ext cx="0" cy="0"/>
+          <a:chOff x="0" y="0"/>
+          <a:chExt cx="0" cy="0"/>
+        </a:xfrm>
+      </p:grpSpPr>
+    </p:spTree>
+    <p:extLst>
+      <p:ext uri="{BB962C8B-B14F-4D97-AF65-F5344CB8AC3E}">
+        <p14:creationId xmlns:p14="http://schemas.microsoft.com/office/powerpoint/2010/main" val="3546353873"/>
+      </p:ext>
+    </p:extLst>
+  </p:cSld>
+  <p:clrMapOvr>
+    <a:masterClrMapping/>
+  </p:clrMapOvr>
+</p:sld>
+</file>
+
+<file path=ppt/slides/slide14.xml><?xml version="1.0" encoding="utf-8"?>
+<p:sld xmlns:a="http://schemas.openxmlformats.org/drawingml/2006/main" xmlns:r="http://schemas.openxmlformats.org/officeDocument/2006/relationships" xmlns:p="http://schemas.openxmlformats.org/presentationml/2006/main">
+  <p:cSld>
+    <p:spTree>
+      <p:nvGrpSpPr>
+        <p:cNvPr id="1" name=""/>
+        <p:cNvGrpSpPr/>
+        <p:nvPr/>
+      </p:nvGrpSpPr>
+      <p:grpSpPr>
+        <a:xfrm>
+          <a:off x="0" y="0"/>
+          <a:ext cx="0" cy="0"/>
+          <a:chOff x="0" y="0"/>
+          <a:chExt cx="0" cy="0"/>
+        </a:xfrm>
+      </p:grpSpPr>
+    </p:spTree>
+    <p:extLst>
+      <p:ext uri="{BB962C8B-B14F-4D97-AF65-F5344CB8AC3E}">
+        <p14:creationId xmlns:p14="http://schemas.microsoft.com/office/powerpoint/2010/main" val="2655669551"/>
+      </p:ext>
+    </p:extLst>
+  </p:cSld>
+  <p:clrMapOvr>
+    <a:masterClrMapping/>
+  </p:clrMapOvr>
+</p:sld>
+</file>
+
+<file path=ppt/slides/slide2.xml><?xml version="1.0" encoding="utf-8"?>
+<p:sld xmlns:a="http://schemas.openxmlformats.org/drawingml/2006/main" xmlns:r="http://schemas.openxmlformats.org/officeDocument/2006/relationships" xmlns:p="http://schemas.openxmlformats.org/presentationml/2006/main">
+  <p:cSld>
+    <p:spTree>
+      <p:nvGrpSpPr>
+        <p:cNvPr id="1" name=""/>
+        <p:cNvGrpSpPr/>
+        <p:nvPr/>
+      </p:nvGrpSpPr>
+      <p:grpSpPr>
+        <a:xfrm>
+          <a:off x="0" y="0"/>
+          <a:ext cx="0" cy="0"/>
+          <a:chOff x="0" y="0"/>
+          <a:chExt cx="0" cy="0"/>
+        </a:xfrm>
+      </p:grpSpPr>
+      <p:sp>
+        <p:nvSpPr>
+          <p:cNvPr id="4" name="Rectangle: Rounded Corners 3">
+            <a:extLst>
+              <a:ext uri="{FF2B5EF4-FFF2-40B4-BE49-F238E27FC236}">
+                <a16:creationId xmlns:a16="http://schemas.microsoft.com/office/drawing/2014/main" id="{1D6F27C4-C712-41B0-9CE2-E729028AE5D4}"/>
+              </a:ext>
+            </a:extLst>
+          </p:cNvPr>
+          <p:cNvSpPr/>
+          <p:nvPr/>
+        </p:nvSpPr>
+        <p:spPr>
+          <a:xfrm>
+            <a:off x="0" y="2619"/>
+            <a:ext cx="2286000" cy="1015664"/>
+          </a:xfrm>
+          <a:prstGeom prst="roundRect">
+            <a:avLst/>
+          </a:prstGeom>
+          <a:noFill/>
+          <a:ln>
+            <a:solidFill>
+              <a:schemeClr val="tx1"/>
+            </a:solidFill>
+          </a:ln>
+        </p:spPr>
+        <p:style>
+          <a:lnRef idx="2">
+            <a:schemeClr val="accent1">
+              <a:shade val="50000"/>
+            </a:schemeClr>
+          </a:lnRef>
+          <a:fillRef idx="1">
+            <a:schemeClr val="accent1"/>
+          </a:fillRef>
+          <a:effectRef idx="0">
+            <a:schemeClr val="accent1"/>
+          </a:effectRef>
+          <a:fontRef idx="minor">
+            <a:schemeClr val="lt1"/>
+          </a:fontRef>
+        </p:style>
+        <p:txBody>
+          <a:bodyPr rot="0" spcFirstLastPara="0" vertOverflow="overflow" horzOverflow="overflow" vert="horz" wrap="square" lIns="116586" tIns="58293" rIns="116586" bIns="58293" numCol="1" spcCol="0" rtlCol="0" fromWordArt="0" anchor="ctr" anchorCtr="0" forceAA="0" compatLnSpc="1">
+            <a:prstTxWarp prst="textNoShape">
+              <a:avLst/>
+            </a:prstTxWarp>
+            <a:noAutofit/>
+          </a:bodyPr>
+          <a:lstStyle/>
+          <a:p>
+            <a:pPr algn="ctr"/>
+            <a:r>
+              <a:rPr lang="en-US" sz="2400" dirty="0">
+                <a:solidFill>
+                  <a:schemeClr val="tx1"/>
+                </a:solidFill>
+              </a:rPr>
+              <a:t>Empirical trait data</a:t>
+            </a:r>
+          </a:p>
+        </p:txBody>
+      </p:sp>
+      <p:sp>
+        <p:nvSpPr>
+          <p:cNvPr id="5" name="Rectangle: Rounded Corners 4">
+            <a:extLst>
+              <a:ext uri="{FF2B5EF4-FFF2-40B4-BE49-F238E27FC236}">
+                <a16:creationId xmlns:a16="http://schemas.microsoft.com/office/drawing/2014/main" id="{D030F5E5-2BE2-4694-A8FB-4BB44801FEA4}"/>
+              </a:ext>
+            </a:extLst>
+          </p:cNvPr>
+          <p:cNvSpPr/>
+          <p:nvPr/>
+        </p:nvSpPr>
+        <p:spPr>
+          <a:xfrm>
+            <a:off x="1748452" y="1397672"/>
+            <a:ext cx="2286000" cy="1015664"/>
+          </a:xfrm>
+          <a:prstGeom prst="roundRect">
+            <a:avLst/>
+          </a:prstGeom>
+          <a:noFill/>
+          <a:ln>
+            <a:solidFill>
+              <a:schemeClr val="tx1"/>
+            </a:solidFill>
+          </a:ln>
+        </p:spPr>
+        <p:style>
+          <a:lnRef idx="2">
+            <a:schemeClr val="accent1">
+              <a:shade val="50000"/>
+            </a:schemeClr>
+          </a:lnRef>
+          <a:fillRef idx="1">
+            <a:schemeClr val="accent1"/>
+          </a:fillRef>
+          <a:effectRef idx="0">
+            <a:schemeClr val="accent1"/>
+          </a:effectRef>
+          <a:fontRef idx="minor">
+            <a:schemeClr val="lt1"/>
+          </a:fontRef>
+        </p:style>
+        <p:txBody>
+          <a:bodyPr rot="0" spcFirstLastPara="0" vertOverflow="overflow" horzOverflow="overflow" vert="horz" wrap="square" lIns="116586" tIns="58293" rIns="116586" bIns="58293" numCol="1" spcCol="0" rtlCol="0" fromWordArt="0" anchor="ctr" anchorCtr="0" forceAA="0" compatLnSpc="1">
+            <a:prstTxWarp prst="textNoShape">
+              <a:avLst/>
+            </a:prstTxWarp>
+            <a:noAutofit/>
+          </a:bodyPr>
+          <a:lstStyle/>
+          <a:p>
+            <a:pPr algn="ctr"/>
+            <a:r>
+              <a:rPr lang="en-US" sz="2400" dirty="0">
+                <a:solidFill>
+                  <a:schemeClr val="tx1"/>
+                </a:solidFill>
+              </a:rPr>
+              <a:t>Trait thermal performance curves</a:t>
+            </a:r>
+          </a:p>
+        </p:txBody>
+      </p:sp>
+      <p:sp>
+        <p:nvSpPr>
+          <p:cNvPr id="6" name="Rectangle: Rounded Corners 5">
+            <a:extLst>
+              <a:ext uri="{FF2B5EF4-FFF2-40B4-BE49-F238E27FC236}">
+                <a16:creationId xmlns:a16="http://schemas.microsoft.com/office/drawing/2014/main" id="{B7CDFF0C-C215-4E23-ADDD-BBDF29ADBA6E}"/>
+              </a:ext>
+            </a:extLst>
+          </p:cNvPr>
+          <p:cNvSpPr/>
+          <p:nvPr/>
+        </p:nvSpPr>
+        <p:spPr>
+          <a:xfrm>
+            <a:off x="3927330" y="2782343"/>
+            <a:ext cx="2286000" cy="1015664"/>
+          </a:xfrm>
+          <a:prstGeom prst="roundRect">
+            <a:avLst/>
+          </a:prstGeom>
+          <a:noFill/>
+          <a:ln>
+            <a:solidFill>
+              <a:schemeClr val="tx1"/>
+            </a:solidFill>
+          </a:ln>
+        </p:spPr>
+        <p:style>
+          <a:lnRef idx="2">
+            <a:schemeClr val="accent1">
+              <a:shade val="50000"/>
+            </a:schemeClr>
+          </a:lnRef>
+          <a:fillRef idx="1">
+            <a:schemeClr val="accent1"/>
+          </a:fillRef>
+          <a:effectRef idx="0">
+            <a:schemeClr val="accent1"/>
+          </a:effectRef>
+          <a:fontRef idx="minor">
+            <a:schemeClr val="lt1"/>
+          </a:fontRef>
+        </p:style>
+        <p:txBody>
+          <a:bodyPr rot="0" spcFirstLastPara="0" vertOverflow="overflow" horzOverflow="overflow" vert="horz" wrap="square" lIns="116586" tIns="58293" rIns="116586" bIns="58293" numCol="1" spcCol="0" rtlCol="0" fromWordArt="0" anchor="ctr" anchorCtr="0" forceAA="0" compatLnSpc="1">
+            <a:prstTxWarp prst="textNoShape">
+              <a:avLst/>
+            </a:prstTxWarp>
+            <a:noAutofit/>
+          </a:bodyPr>
+          <a:lstStyle/>
+          <a:p>
+            <a:pPr algn="ctr"/>
+            <a:r>
+              <a:rPr lang="en-US" sz="2400" dirty="0">
+                <a:solidFill>
+                  <a:schemeClr val="tx1"/>
+                </a:solidFill>
+              </a:rPr>
+              <a:t>Model parameters</a:t>
+            </a:r>
+          </a:p>
+        </p:txBody>
+      </p:sp>
+      <p:sp>
+        <p:nvSpPr>
+          <p:cNvPr id="7" name="Rectangle: Rounded Corners 6">
+            <a:extLst>
+              <a:ext uri="{FF2B5EF4-FFF2-40B4-BE49-F238E27FC236}">
+                <a16:creationId xmlns:a16="http://schemas.microsoft.com/office/drawing/2014/main" id="{86EC3EA4-BEFE-4971-BD98-2A658366E09C}"/>
+              </a:ext>
+            </a:extLst>
+          </p:cNvPr>
+          <p:cNvSpPr/>
+          <p:nvPr/>
+        </p:nvSpPr>
+        <p:spPr>
+          <a:xfrm>
+            <a:off x="6096000" y="4167014"/>
+            <a:ext cx="2286000" cy="1015664"/>
+          </a:xfrm>
+          <a:prstGeom prst="roundRect">
+            <a:avLst/>
+          </a:prstGeom>
+          <a:noFill/>
+          <a:ln>
+            <a:solidFill>
+              <a:schemeClr val="tx1"/>
+            </a:solidFill>
+          </a:ln>
+        </p:spPr>
+        <p:style>
+          <a:lnRef idx="2">
+            <a:schemeClr val="accent1">
+              <a:shade val="50000"/>
+            </a:schemeClr>
+          </a:lnRef>
+          <a:fillRef idx="1">
+            <a:schemeClr val="accent1"/>
+          </a:fillRef>
+          <a:effectRef idx="0">
+            <a:schemeClr val="accent1"/>
+          </a:effectRef>
+          <a:fontRef idx="minor">
+            <a:schemeClr val="lt1"/>
+          </a:fontRef>
+        </p:style>
+        <p:txBody>
+          <a:bodyPr rot="0" spcFirstLastPara="0" vertOverflow="overflow" horzOverflow="overflow" vert="horz" wrap="square" lIns="116586" tIns="58293" rIns="116586" bIns="58293" numCol="1" spcCol="0" rtlCol="0" fromWordArt="0" anchor="ctr" anchorCtr="0" forceAA="0" compatLnSpc="1">
+            <a:prstTxWarp prst="textNoShape">
+              <a:avLst/>
+            </a:prstTxWarp>
+            <a:noAutofit/>
+          </a:bodyPr>
+          <a:lstStyle/>
+          <a:p>
+            <a:pPr algn="ctr"/>
+            <a:r>
+              <a:rPr lang="en-US" sz="2400" dirty="0">
+                <a:solidFill>
+                  <a:schemeClr val="tx1"/>
+                </a:solidFill>
+              </a:rPr>
+              <a:t>Compartmental model</a:t>
+            </a:r>
+          </a:p>
+        </p:txBody>
+      </p:sp>
+      <p:sp>
+        <p:nvSpPr>
+          <p:cNvPr id="8" name="Rectangle: Rounded Corners 7">
+            <a:extLst>
+              <a:ext uri="{FF2B5EF4-FFF2-40B4-BE49-F238E27FC236}">
+                <a16:creationId xmlns:a16="http://schemas.microsoft.com/office/drawing/2014/main" id="{C14CB31B-1C2A-482A-B179-4658E907ED9D}"/>
+              </a:ext>
+            </a:extLst>
+          </p:cNvPr>
+          <p:cNvSpPr/>
+          <p:nvPr/>
+        </p:nvSpPr>
+        <p:spPr>
+          <a:xfrm>
+            <a:off x="8382000" y="5841702"/>
+            <a:ext cx="2286000" cy="1015664"/>
+          </a:xfrm>
+          <a:prstGeom prst="roundRect">
+            <a:avLst/>
+          </a:prstGeom>
+          <a:noFill/>
+          <a:ln>
+            <a:solidFill>
+              <a:schemeClr val="tx1"/>
+            </a:solidFill>
+          </a:ln>
+        </p:spPr>
+        <p:style>
+          <a:lnRef idx="2">
+            <a:schemeClr val="accent1">
+              <a:shade val="50000"/>
+            </a:schemeClr>
+          </a:lnRef>
+          <a:fillRef idx="1">
+            <a:schemeClr val="accent1"/>
+          </a:fillRef>
+          <a:effectRef idx="0">
+            <a:schemeClr val="accent1"/>
+          </a:effectRef>
+          <a:fontRef idx="minor">
+            <a:schemeClr val="lt1"/>
+          </a:fontRef>
+        </p:style>
+        <p:txBody>
+          <a:bodyPr rot="0" spcFirstLastPara="0" vertOverflow="overflow" horzOverflow="overflow" vert="horz" wrap="square" lIns="116586" tIns="58293" rIns="116586" bIns="58293" numCol="1" spcCol="0" rtlCol="0" fromWordArt="0" anchor="ctr" anchorCtr="0" forceAA="0" compatLnSpc="1">
+            <a:prstTxWarp prst="textNoShape">
+              <a:avLst/>
+            </a:prstTxWarp>
+            <a:noAutofit/>
+          </a:bodyPr>
+          <a:lstStyle/>
+          <a:p>
+            <a:pPr algn="ctr"/>
+            <a:r>
+              <a:rPr lang="en-US" sz="2400" dirty="0">
+                <a:solidFill>
+                  <a:schemeClr val="tx1"/>
+                </a:solidFill>
+              </a:rPr>
+              <a:t>Transmission potential</a:t>
+            </a:r>
+          </a:p>
+        </p:txBody>
+      </p:sp>
+      <p:sp>
+        <p:nvSpPr>
+          <p:cNvPr id="13" name="TextBox 12">
+            <a:extLst>
+              <a:ext uri="{FF2B5EF4-FFF2-40B4-BE49-F238E27FC236}">
+                <a16:creationId xmlns:a16="http://schemas.microsoft.com/office/drawing/2014/main" id="{16F846FA-501E-43A3-AF1D-CB9A3E9E80A6}"/>
+              </a:ext>
+            </a:extLst>
+          </p:cNvPr>
+          <p:cNvSpPr txBox="1"/>
+          <p:nvPr/>
+        </p:nvSpPr>
+        <p:spPr>
+          <a:xfrm>
+            <a:off x="2586939" y="48786"/>
+            <a:ext cx="3225799" cy="1015663"/>
+          </a:xfrm>
+          <a:prstGeom prst="rect">
+            <a:avLst/>
+          </a:prstGeom>
+          <a:noFill/>
+        </p:spPr>
+        <p:txBody>
+          <a:bodyPr wrap="square" rtlCol="0">
+            <a:spAutoFit/>
+          </a:bodyPr>
+          <a:lstStyle/>
+          <a:p>
+            <a:r>
+              <a:rPr lang="en-US" sz="2000" b="1" u="sng" dirty="0"/>
+              <a:t>Step 1</a:t>
+            </a:r>
+            <a:r>
+              <a:rPr lang="en-US" sz="2000" b="1" dirty="0"/>
+              <a:t>: </a:t>
+            </a:r>
+            <a:br>
+              <a:rPr lang="en-US" sz="2000" b="1" dirty="0"/>
+            </a:br>
+            <a:r>
+              <a:rPr lang="en-US" sz="2000" dirty="0"/>
+              <a:t>Collect empirical data for mosquito traits</a:t>
+            </a:r>
+            <a:endParaRPr lang="en-US" sz="2000" b="1" u="sng" dirty="0"/>
+          </a:p>
+        </p:txBody>
+      </p:sp>
+      <p:sp>
+        <p:nvSpPr>
+          <p:cNvPr id="14" name="TextBox 13">
+            <a:extLst>
+              <a:ext uri="{FF2B5EF4-FFF2-40B4-BE49-F238E27FC236}">
+                <a16:creationId xmlns:a16="http://schemas.microsoft.com/office/drawing/2014/main" id="{818CE4FD-B72D-4044-A1AC-23A5697B690D}"/>
+              </a:ext>
+            </a:extLst>
+          </p:cNvPr>
+          <p:cNvSpPr txBox="1"/>
+          <p:nvPr/>
+        </p:nvSpPr>
+        <p:spPr>
+          <a:xfrm>
+            <a:off x="-14827" y="1530675"/>
+            <a:ext cx="1818872" cy="1323439"/>
+          </a:xfrm>
+          <a:prstGeom prst="rect">
+            <a:avLst/>
+          </a:prstGeom>
+          <a:noFill/>
+        </p:spPr>
+        <p:txBody>
+          <a:bodyPr wrap="square" rtlCol="0">
+            <a:spAutoFit/>
+          </a:bodyPr>
+          <a:lstStyle/>
+          <a:p>
+            <a:r>
+              <a:rPr lang="en-US" sz="2000" b="1" u="sng" dirty="0"/>
+              <a:t>Step 2</a:t>
+            </a:r>
+            <a:r>
+              <a:rPr lang="en-US" sz="2000" b="1" dirty="0"/>
+              <a:t>: </a:t>
+            </a:r>
+            <a:br>
+              <a:rPr lang="en-US" sz="2000" b="1" dirty="0"/>
+            </a:br>
+            <a:r>
+              <a:rPr lang="en-US" sz="2000" dirty="0"/>
+              <a:t>Fit trait thermal performance curves</a:t>
+            </a:r>
+            <a:endParaRPr lang="en-US" sz="2000" b="1" u="sng" dirty="0"/>
+          </a:p>
+        </p:txBody>
+      </p:sp>
+      <p:sp>
+        <p:nvSpPr>
+          <p:cNvPr id="15" name="TextBox 14">
+            <a:extLst>
+              <a:ext uri="{FF2B5EF4-FFF2-40B4-BE49-F238E27FC236}">
+                <a16:creationId xmlns:a16="http://schemas.microsoft.com/office/drawing/2014/main" id="{4944C540-58C9-4FE1-B01D-8AB415EC2F75}"/>
+              </a:ext>
+            </a:extLst>
+          </p:cNvPr>
+          <p:cNvSpPr txBox="1"/>
+          <p:nvPr/>
+        </p:nvSpPr>
+        <p:spPr>
+          <a:xfrm>
+            <a:off x="1895744" y="2714178"/>
+            <a:ext cx="2165632" cy="1323439"/>
+          </a:xfrm>
+          <a:prstGeom prst="rect">
+            <a:avLst/>
+          </a:prstGeom>
+          <a:noFill/>
+        </p:spPr>
+        <p:txBody>
+          <a:bodyPr wrap="square" rtlCol="0">
+            <a:spAutoFit/>
+          </a:bodyPr>
+          <a:lstStyle/>
+          <a:p>
+            <a:r>
+              <a:rPr lang="en-US" sz="2000" b="1" u="sng" dirty="0"/>
+              <a:t>Step 3</a:t>
+            </a:r>
+            <a:r>
+              <a:rPr lang="en-US" sz="2000" b="1" dirty="0"/>
+              <a:t>: </a:t>
+            </a:r>
+            <a:br>
+              <a:rPr lang="en-US" sz="2000" b="1" dirty="0"/>
+            </a:br>
+            <a:r>
+              <a:rPr lang="en-US" sz="2000" dirty="0"/>
+              <a:t>Transform traits into model parameters</a:t>
+            </a:r>
+            <a:endParaRPr lang="en-US" sz="2000" b="1" u="sng" dirty="0"/>
+          </a:p>
+        </p:txBody>
+      </p:sp>
+      <p:sp>
+        <p:nvSpPr>
+          <p:cNvPr id="16" name="TextBox 15">
+            <a:extLst>
+              <a:ext uri="{FF2B5EF4-FFF2-40B4-BE49-F238E27FC236}">
+                <a16:creationId xmlns:a16="http://schemas.microsoft.com/office/drawing/2014/main" id="{F8E2ABFB-F464-4612-AEAD-3EB1D9CBEF06}"/>
+              </a:ext>
+            </a:extLst>
+          </p:cNvPr>
+          <p:cNvSpPr txBox="1"/>
+          <p:nvPr/>
+        </p:nvSpPr>
+        <p:spPr>
+          <a:xfrm>
+            <a:off x="3813038" y="3987118"/>
+            <a:ext cx="2165632" cy="1323439"/>
+          </a:xfrm>
+          <a:prstGeom prst="rect">
+            <a:avLst/>
+          </a:prstGeom>
+          <a:noFill/>
+        </p:spPr>
+        <p:txBody>
+          <a:bodyPr wrap="square" rtlCol="0">
+            <a:spAutoFit/>
+          </a:bodyPr>
+          <a:lstStyle/>
+          <a:p>
+            <a:r>
+              <a:rPr lang="en-US" sz="2000" b="1" u="sng" dirty="0"/>
+              <a:t>Step 4</a:t>
+            </a:r>
+            <a:r>
+              <a:rPr lang="en-US" sz="2000" b="1" dirty="0"/>
+              <a:t>: </a:t>
+            </a:r>
+            <a:br>
+              <a:rPr lang="en-US" sz="2000" b="1" dirty="0"/>
+            </a:br>
+            <a:r>
+              <a:rPr lang="en-US" sz="2000" dirty="0"/>
+              <a:t>Build data frame incorporating all axes of variation</a:t>
+            </a:r>
+            <a:endParaRPr lang="en-US" sz="2000" b="1" u="sng" dirty="0"/>
+          </a:p>
+        </p:txBody>
+      </p:sp>
+      <p:sp>
+        <p:nvSpPr>
+          <p:cNvPr id="17" name="TextBox 16">
+            <a:extLst>
+              <a:ext uri="{FF2B5EF4-FFF2-40B4-BE49-F238E27FC236}">
+                <a16:creationId xmlns:a16="http://schemas.microsoft.com/office/drawing/2014/main" id="{0A5C4763-A976-4919-AA12-DA55BF001142}"/>
+              </a:ext>
+            </a:extLst>
+          </p:cNvPr>
+          <p:cNvSpPr txBox="1"/>
+          <p:nvPr/>
+        </p:nvSpPr>
+        <p:spPr>
+          <a:xfrm>
+            <a:off x="6399985" y="5421059"/>
+            <a:ext cx="2054585" cy="1323439"/>
+          </a:xfrm>
+          <a:prstGeom prst="rect">
+            <a:avLst/>
+          </a:prstGeom>
+          <a:noFill/>
+        </p:spPr>
+        <p:txBody>
+          <a:bodyPr wrap="square" rtlCol="0">
+            <a:spAutoFit/>
+          </a:bodyPr>
+          <a:lstStyle/>
+          <a:p>
+            <a:r>
+              <a:rPr lang="en-US" sz="2000" b="1" u="sng" dirty="0"/>
+              <a:t>Step 5</a:t>
+            </a:r>
+            <a:r>
+              <a:rPr lang="en-US" sz="2000" b="1" dirty="0"/>
+              <a:t>: </a:t>
+            </a:r>
+            <a:br>
+              <a:rPr lang="en-US" sz="2000" b="1" dirty="0"/>
+            </a:br>
+            <a:r>
+              <a:rPr lang="en-US" sz="2000" dirty="0"/>
+              <a:t>Analysis and visualization of model outputs</a:t>
+            </a:r>
+            <a:endParaRPr lang="en-US" sz="2000" b="1" u="sng" dirty="0"/>
+          </a:p>
+        </p:txBody>
+      </p:sp>
+      <p:sp>
+        <p:nvSpPr>
+          <p:cNvPr id="18" name="TextBox 17">
+            <a:extLst>
+              <a:ext uri="{FF2B5EF4-FFF2-40B4-BE49-F238E27FC236}">
+                <a16:creationId xmlns:a16="http://schemas.microsoft.com/office/drawing/2014/main" id="{AF7BA02E-58F6-4D97-9C01-712D4A055B47}"/>
+              </a:ext>
+            </a:extLst>
+          </p:cNvPr>
+          <p:cNvSpPr txBox="1"/>
+          <p:nvPr/>
+        </p:nvSpPr>
+        <p:spPr>
+          <a:xfrm>
+            <a:off x="10110626" y="4750443"/>
+            <a:ext cx="2286001" cy="1015663"/>
+          </a:xfrm>
+          <a:prstGeom prst="rect">
+            <a:avLst/>
+          </a:prstGeom>
+          <a:noFill/>
+        </p:spPr>
+        <p:txBody>
+          <a:bodyPr wrap="square" rtlCol="0">
+            <a:spAutoFit/>
+          </a:bodyPr>
+          <a:lstStyle/>
+          <a:p>
+            <a:r>
+              <a:rPr lang="en-US" sz="2000" b="1" u="sng" dirty="0"/>
+              <a:t>Step 6</a:t>
+            </a:r>
+            <a:r>
+              <a:rPr lang="en-US" sz="2000" b="1" dirty="0"/>
+              <a:t>: </a:t>
+            </a:r>
+            <a:br>
+              <a:rPr lang="en-US" sz="2000" b="1" dirty="0"/>
+            </a:br>
+            <a:r>
+              <a:rPr lang="en-US" sz="2000" dirty="0"/>
+              <a:t>Sensitivity analysis of outputs</a:t>
+            </a:r>
+            <a:endParaRPr lang="en-US" sz="2000" b="1" u="sng" dirty="0"/>
+          </a:p>
+        </p:txBody>
+      </p:sp>
+      <p:cxnSp>
+        <p:nvCxnSpPr>
+          <p:cNvPr id="19" name="Straight Arrow Connector 18">
+            <a:extLst>
+              <a:ext uri="{FF2B5EF4-FFF2-40B4-BE49-F238E27FC236}">
+                <a16:creationId xmlns:a16="http://schemas.microsoft.com/office/drawing/2014/main" id="{9B7A3E02-3A1F-477D-BC12-0159BDEA550C}"/>
+              </a:ext>
+            </a:extLst>
+          </p:cNvPr>
+          <p:cNvCxnSpPr>
+            <a:cxnSpLocks/>
+            <a:stCxn id="4" idx="2"/>
+            <a:endCxn id="5" idx="1"/>
+          </p:cNvCxnSpPr>
+          <p:nvPr/>
+        </p:nvCxnSpPr>
+        <p:spPr>
+          <a:xfrm>
+            <a:off x="1143000" y="1018283"/>
+            <a:ext cx="605452" cy="887221"/>
+          </a:xfrm>
+          <a:prstGeom prst="straightConnector1">
+            <a:avLst/>
+          </a:prstGeom>
+          <a:ln w="38100">
+            <a:solidFill>
+              <a:schemeClr val="tx1"/>
+            </a:solidFill>
+            <a:tailEnd type="triangle"/>
+          </a:ln>
+        </p:spPr>
+        <p:style>
+          <a:lnRef idx="1">
+            <a:schemeClr val="accent1"/>
+          </a:lnRef>
+          <a:fillRef idx="0">
+            <a:schemeClr val="accent1"/>
+          </a:fillRef>
+          <a:effectRef idx="0">
+            <a:schemeClr val="accent1"/>
+          </a:effectRef>
+          <a:fontRef idx="minor">
+            <a:schemeClr val="tx1"/>
+          </a:fontRef>
+        </p:style>
+      </p:cxnSp>
+      <p:cxnSp>
+        <p:nvCxnSpPr>
+          <p:cNvPr id="20" name="Straight Arrow Connector 19">
+            <a:extLst>
+              <a:ext uri="{FF2B5EF4-FFF2-40B4-BE49-F238E27FC236}">
+                <a16:creationId xmlns:a16="http://schemas.microsoft.com/office/drawing/2014/main" id="{2ED5E13B-1E1F-4227-B1A2-680EFB01008B}"/>
+              </a:ext>
+            </a:extLst>
+          </p:cNvPr>
+          <p:cNvCxnSpPr>
+            <a:cxnSpLocks/>
+            <a:stCxn id="5" idx="2"/>
+            <a:endCxn id="6" idx="1"/>
+          </p:cNvCxnSpPr>
+          <p:nvPr/>
+        </p:nvCxnSpPr>
+        <p:spPr>
+          <a:xfrm>
+            <a:off x="2891452" y="2413336"/>
+            <a:ext cx="1035878" cy="876839"/>
+          </a:xfrm>
+          <a:prstGeom prst="straightConnector1">
+            <a:avLst/>
+          </a:prstGeom>
+          <a:ln w="38100">
+            <a:solidFill>
+              <a:schemeClr val="tx1"/>
+            </a:solidFill>
+            <a:tailEnd type="triangle"/>
+          </a:ln>
+        </p:spPr>
+        <p:style>
+          <a:lnRef idx="1">
+            <a:schemeClr val="accent1"/>
+          </a:lnRef>
+          <a:fillRef idx="0">
+            <a:schemeClr val="accent1"/>
+          </a:fillRef>
+          <a:effectRef idx="0">
+            <a:schemeClr val="accent1"/>
+          </a:effectRef>
+          <a:fontRef idx="minor">
+            <a:schemeClr val="tx1"/>
+          </a:fontRef>
+        </p:style>
+      </p:cxnSp>
+      <p:cxnSp>
+        <p:nvCxnSpPr>
+          <p:cNvPr id="21" name="Straight Arrow Connector 20">
+            <a:extLst>
+              <a:ext uri="{FF2B5EF4-FFF2-40B4-BE49-F238E27FC236}">
+                <a16:creationId xmlns:a16="http://schemas.microsoft.com/office/drawing/2014/main" id="{CD7E8885-9D7E-4D70-815A-2173924C035B}"/>
+              </a:ext>
+            </a:extLst>
+          </p:cNvPr>
+          <p:cNvCxnSpPr>
+            <a:cxnSpLocks/>
+            <a:stCxn id="6" idx="2"/>
+            <a:endCxn id="7" idx="1"/>
+          </p:cNvCxnSpPr>
+          <p:nvPr/>
+        </p:nvCxnSpPr>
+        <p:spPr>
+          <a:xfrm>
+            <a:off x="5070330" y="3798007"/>
+            <a:ext cx="1025670" cy="876839"/>
+          </a:xfrm>
+          <a:prstGeom prst="straightConnector1">
+            <a:avLst/>
+          </a:prstGeom>
+          <a:ln w="38100">
+            <a:solidFill>
+              <a:schemeClr val="tx1"/>
+            </a:solidFill>
+            <a:tailEnd type="triangle"/>
+          </a:ln>
+        </p:spPr>
+        <p:style>
+          <a:lnRef idx="1">
+            <a:schemeClr val="accent1"/>
+          </a:lnRef>
+          <a:fillRef idx="0">
+            <a:schemeClr val="accent1"/>
+          </a:fillRef>
+          <a:effectRef idx="0">
+            <a:schemeClr val="accent1"/>
+          </a:effectRef>
+          <a:fontRef idx="minor">
+            <a:schemeClr val="tx1"/>
+          </a:fontRef>
+        </p:style>
+      </p:cxnSp>
+      <p:cxnSp>
+        <p:nvCxnSpPr>
+          <p:cNvPr id="22" name="Straight Arrow Connector 21">
+            <a:extLst>
+              <a:ext uri="{FF2B5EF4-FFF2-40B4-BE49-F238E27FC236}">
+                <a16:creationId xmlns:a16="http://schemas.microsoft.com/office/drawing/2014/main" id="{0AA109FF-2D21-4328-B881-F8D1B75E4D63}"/>
+              </a:ext>
+            </a:extLst>
+          </p:cNvPr>
+          <p:cNvCxnSpPr>
+            <a:cxnSpLocks/>
+            <a:stCxn id="7" idx="2"/>
+            <a:endCxn id="8" idx="1"/>
+          </p:cNvCxnSpPr>
+          <p:nvPr/>
+        </p:nvCxnSpPr>
+        <p:spPr>
+          <a:xfrm>
+            <a:off x="7239000" y="5182678"/>
+            <a:ext cx="1143000" cy="1166856"/>
+          </a:xfrm>
+          <a:prstGeom prst="straightConnector1">
+            <a:avLst/>
+          </a:prstGeom>
+          <a:ln w="38100">
+            <a:solidFill>
+              <a:schemeClr val="tx1"/>
+            </a:solidFill>
+            <a:tailEnd type="triangle"/>
+          </a:ln>
+        </p:spPr>
+        <p:style>
+          <a:lnRef idx="1">
+            <a:schemeClr val="accent1"/>
+          </a:lnRef>
+          <a:fillRef idx="0">
+            <a:schemeClr val="accent1"/>
+          </a:fillRef>
+          <a:effectRef idx="0">
+            <a:schemeClr val="accent1"/>
+          </a:effectRef>
+          <a:fontRef idx="minor">
+            <a:schemeClr val="tx1"/>
+          </a:fontRef>
+        </p:style>
+      </p:cxnSp>
+    </p:spTree>
+    <p:extLst>
+      <p:ext uri="{BB962C8B-B14F-4D97-AF65-F5344CB8AC3E}">
+        <p14:creationId xmlns:p14="http://schemas.microsoft.com/office/powerpoint/2010/main" val="3976698995"/>
       </p:ext>
     </p:extLst>
   </p:cSld>
@@ -3471,46 +4625,772 @@
           <a:chExt cx="0" cy="0"/>
         </a:xfrm>
       </p:grpSpPr>
-      <p:pic>
-        <p:nvPicPr>
-          <p:cNvPr id="3" name="Picture 2">
-            <a:extLst>
-              <a:ext uri="{FF2B5EF4-FFF2-40B4-BE49-F238E27FC236}">
-                <a16:creationId xmlns:a16="http://schemas.microsoft.com/office/drawing/2014/main" id="{AB24ECC5-BE95-4259-988C-666617F3A139}"/>
-              </a:ext>
-            </a:extLst>
-          </p:cNvPr>
-          <p:cNvPicPr>
-            <a:picLocks noChangeAspect="1"/>
-          </p:cNvPicPr>
+      <p:sp>
+        <p:nvSpPr>
+          <p:cNvPr id="4" name="Rectangle: Rounded Corners 3">
+            <a:extLst>
+              <a:ext uri="{FF2B5EF4-FFF2-40B4-BE49-F238E27FC236}">
+                <a16:creationId xmlns:a16="http://schemas.microsoft.com/office/drawing/2014/main" id="{1D6F27C4-C712-41B0-9CE2-E729028AE5D4}"/>
+              </a:ext>
+            </a:extLst>
+          </p:cNvPr>
+          <p:cNvSpPr/>
           <p:nvPr/>
-        </p:nvPicPr>
-        <p:blipFill>
-          <a:blip r:embed="rId2">
-            <a:extLst>
-              <a:ext uri="{28A0092B-C50C-407E-A947-70E740481C1C}">
-                <a14:useLocalDpi xmlns:a14="http://schemas.microsoft.com/office/drawing/2010/main" val="0"/>
-              </a:ext>
-            </a:extLst>
-          </a:blip>
-          <a:stretch>
-            <a:fillRect/>
-          </a:stretch>
-        </p:blipFill>
-        <p:spPr>
-          <a:xfrm>
-            <a:off x="0" y="200025"/>
-            <a:ext cx="12192000" cy="6457950"/>
+        </p:nvSpPr>
+        <p:spPr>
+          <a:xfrm>
+            <a:off x="0" y="2619"/>
+            <a:ext cx="2286000" cy="1015664"/>
+          </a:xfrm>
+          <a:prstGeom prst="roundRect">
+            <a:avLst/>
+          </a:prstGeom>
+          <a:noFill/>
+          <a:ln>
+            <a:solidFill>
+              <a:schemeClr val="tx1"/>
+            </a:solidFill>
+          </a:ln>
+        </p:spPr>
+        <p:style>
+          <a:lnRef idx="2">
+            <a:schemeClr val="accent1">
+              <a:shade val="50000"/>
+            </a:schemeClr>
+          </a:lnRef>
+          <a:fillRef idx="1">
+            <a:schemeClr val="accent1"/>
+          </a:fillRef>
+          <a:effectRef idx="0">
+            <a:schemeClr val="accent1"/>
+          </a:effectRef>
+          <a:fontRef idx="minor">
+            <a:schemeClr val="lt1"/>
+          </a:fontRef>
+        </p:style>
+        <p:txBody>
+          <a:bodyPr rot="0" spcFirstLastPara="0" vertOverflow="overflow" horzOverflow="overflow" vert="horz" wrap="square" lIns="116586" tIns="58293" rIns="116586" bIns="58293" numCol="1" spcCol="0" rtlCol="0" fromWordArt="0" anchor="ctr" anchorCtr="0" forceAA="0" compatLnSpc="1">
+            <a:prstTxWarp prst="textNoShape">
+              <a:avLst/>
+            </a:prstTxWarp>
+            <a:noAutofit/>
+          </a:bodyPr>
+          <a:lstStyle/>
+          <a:p>
+            <a:pPr algn="ctr"/>
+            <a:r>
+              <a:rPr lang="en-US" sz="2400" dirty="0">
+                <a:solidFill>
+                  <a:schemeClr val="tx1"/>
+                </a:solidFill>
+              </a:rPr>
+              <a:t>Empirical trait data</a:t>
+            </a:r>
+          </a:p>
+        </p:txBody>
+      </p:sp>
+      <p:sp>
+        <p:nvSpPr>
+          <p:cNvPr id="5" name="Rectangle: Rounded Corners 4">
+            <a:extLst>
+              <a:ext uri="{FF2B5EF4-FFF2-40B4-BE49-F238E27FC236}">
+                <a16:creationId xmlns:a16="http://schemas.microsoft.com/office/drawing/2014/main" id="{D030F5E5-2BE2-4694-A8FB-4BB44801FEA4}"/>
+              </a:ext>
+            </a:extLst>
+          </p:cNvPr>
+          <p:cNvSpPr/>
+          <p:nvPr/>
+        </p:nvSpPr>
+        <p:spPr>
+          <a:xfrm>
+            <a:off x="1748452" y="1397672"/>
+            <a:ext cx="2286000" cy="1015664"/>
+          </a:xfrm>
+          <a:prstGeom prst="roundRect">
+            <a:avLst/>
+          </a:prstGeom>
+          <a:noFill/>
+          <a:ln>
+            <a:solidFill>
+              <a:schemeClr val="tx1"/>
+            </a:solidFill>
+          </a:ln>
+        </p:spPr>
+        <p:style>
+          <a:lnRef idx="2">
+            <a:schemeClr val="accent1">
+              <a:shade val="50000"/>
+            </a:schemeClr>
+          </a:lnRef>
+          <a:fillRef idx="1">
+            <a:schemeClr val="accent1"/>
+          </a:fillRef>
+          <a:effectRef idx="0">
+            <a:schemeClr val="accent1"/>
+          </a:effectRef>
+          <a:fontRef idx="minor">
+            <a:schemeClr val="lt1"/>
+          </a:fontRef>
+        </p:style>
+        <p:txBody>
+          <a:bodyPr rot="0" spcFirstLastPara="0" vertOverflow="overflow" horzOverflow="overflow" vert="horz" wrap="square" lIns="116586" tIns="58293" rIns="116586" bIns="58293" numCol="1" spcCol="0" rtlCol="0" fromWordArt="0" anchor="ctr" anchorCtr="0" forceAA="0" compatLnSpc="1">
+            <a:prstTxWarp prst="textNoShape">
+              <a:avLst/>
+            </a:prstTxWarp>
+            <a:noAutofit/>
+          </a:bodyPr>
+          <a:lstStyle/>
+          <a:p>
+            <a:pPr algn="ctr"/>
+            <a:r>
+              <a:rPr lang="en-US" sz="2400" dirty="0">
+                <a:solidFill>
+                  <a:schemeClr val="tx1"/>
+                </a:solidFill>
+              </a:rPr>
+              <a:t>Trait thermal performance curves</a:t>
+            </a:r>
+          </a:p>
+        </p:txBody>
+      </p:sp>
+      <p:sp>
+        <p:nvSpPr>
+          <p:cNvPr id="6" name="Rectangle: Rounded Corners 5">
+            <a:extLst>
+              <a:ext uri="{FF2B5EF4-FFF2-40B4-BE49-F238E27FC236}">
+                <a16:creationId xmlns:a16="http://schemas.microsoft.com/office/drawing/2014/main" id="{B7CDFF0C-C215-4E23-ADDD-BBDF29ADBA6E}"/>
+              </a:ext>
+            </a:extLst>
+          </p:cNvPr>
+          <p:cNvSpPr/>
+          <p:nvPr/>
+        </p:nvSpPr>
+        <p:spPr>
+          <a:xfrm>
+            <a:off x="3927330" y="2782343"/>
+            <a:ext cx="2286000" cy="1015664"/>
+          </a:xfrm>
+          <a:prstGeom prst="roundRect">
+            <a:avLst/>
+          </a:prstGeom>
+          <a:noFill/>
+          <a:ln>
+            <a:solidFill>
+              <a:schemeClr val="tx1"/>
+            </a:solidFill>
+          </a:ln>
+        </p:spPr>
+        <p:style>
+          <a:lnRef idx="2">
+            <a:schemeClr val="accent1">
+              <a:shade val="50000"/>
+            </a:schemeClr>
+          </a:lnRef>
+          <a:fillRef idx="1">
+            <a:schemeClr val="accent1"/>
+          </a:fillRef>
+          <a:effectRef idx="0">
+            <a:schemeClr val="accent1"/>
+          </a:effectRef>
+          <a:fontRef idx="minor">
+            <a:schemeClr val="lt1"/>
+          </a:fontRef>
+        </p:style>
+        <p:txBody>
+          <a:bodyPr rot="0" spcFirstLastPara="0" vertOverflow="overflow" horzOverflow="overflow" vert="horz" wrap="square" lIns="116586" tIns="58293" rIns="116586" bIns="58293" numCol="1" spcCol="0" rtlCol="0" fromWordArt="0" anchor="ctr" anchorCtr="0" forceAA="0" compatLnSpc="1">
+            <a:prstTxWarp prst="textNoShape">
+              <a:avLst/>
+            </a:prstTxWarp>
+            <a:noAutofit/>
+          </a:bodyPr>
+          <a:lstStyle/>
+          <a:p>
+            <a:pPr algn="ctr"/>
+            <a:r>
+              <a:rPr lang="en-US" sz="2400" dirty="0">
+                <a:solidFill>
+                  <a:schemeClr val="tx1"/>
+                </a:solidFill>
+              </a:rPr>
+              <a:t>Model parameters</a:t>
+            </a:r>
+          </a:p>
+        </p:txBody>
+      </p:sp>
+      <p:sp>
+        <p:nvSpPr>
+          <p:cNvPr id="7" name="Rectangle: Rounded Corners 6">
+            <a:extLst>
+              <a:ext uri="{FF2B5EF4-FFF2-40B4-BE49-F238E27FC236}">
+                <a16:creationId xmlns:a16="http://schemas.microsoft.com/office/drawing/2014/main" id="{86EC3EA4-BEFE-4971-BD98-2A658366E09C}"/>
+              </a:ext>
+            </a:extLst>
+          </p:cNvPr>
+          <p:cNvSpPr/>
+          <p:nvPr/>
+        </p:nvSpPr>
+        <p:spPr>
+          <a:xfrm>
+            <a:off x="6096000" y="4167014"/>
+            <a:ext cx="2286000" cy="1015664"/>
+          </a:xfrm>
+          <a:prstGeom prst="roundRect">
+            <a:avLst/>
+          </a:prstGeom>
+          <a:noFill/>
+          <a:ln>
+            <a:solidFill>
+              <a:schemeClr val="tx1"/>
+            </a:solidFill>
+          </a:ln>
+        </p:spPr>
+        <p:style>
+          <a:lnRef idx="2">
+            <a:schemeClr val="accent1">
+              <a:shade val="50000"/>
+            </a:schemeClr>
+          </a:lnRef>
+          <a:fillRef idx="1">
+            <a:schemeClr val="accent1"/>
+          </a:fillRef>
+          <a:effectRef idx="0">
+            <a:schemeClr val="accent1"/>
+          </a:effectRef>
+          <a:fontRef idx="minor">
+            <a:schemeClr val="lt1"/>
+          </a:fontRef>
+        </p:style>
+        <p:txBody>
+          <a:bodyPr rot="0" spcFirstLastPara="0" vertOverflow="overflow" horzOverflow="overflow" vert="horz" wrap="square" lIns="116586" tIns="58293" rIns="116586" bIns="58293" numCol="1" spcCol="0" rtlCol="0" fromWordArt="0" anchor="ctr" anchorCtr="0" forceAA="0" compatLnSpc="1">
+            <a:prstTxWarp prst="textNoShape">
+              <a:avLst/>
+            </a:prstTxWarp>
+            <a:noAutofit/>
+          </a:bodyPr>
+          <a:lstStyle/>
+          <a:p>
+            <a:pPr algn="ctr"/>
+            <a:r>
+              <a:rPr lang="en-US" sz="2400" dirty="0">
+                <a:solidFill>
+                  <a:schemeClr val="tx1"/>
+                </a:solidFill>
+              </a:rPr>
+              <a:t>Compartmental model</a:t>
+            </a:r>
+          </a:p>
+        </p:txBody>
+      </p:sp>
+      <p:sp>
+        <p:nvSpPr>
+          <p:cNvPr id="8" name="Rectangle: Rounded Corners 7">
+            <a:extLst>
+              <a:ext uri="{FF2B5EF4-FFF2-40B4-BE49-F238E27FC236}">
+                <a16:creationId xmlns:a16="http://schemas.microsoft.com/office/drawing/2014/main" id="{C14CB31B-1C2A-482A-B179-4658E907ED9D}"/>
+              </a:ext>
+            </a:extLst>
+          </p:cNvPr>
+          <p:cNvSpPr/>
+          <p:nvPr/>
+        </p:nvSpPr>
+        <p:spPr>
+          <a:xfrm>
+            <a:off x="8382000" y="5841702"/>
+            <a:ext cx="2286000" cy="1015664"/>
+          </a:xfrm>
+          <a:prstGeom prst="roundRect">
+            <a:avLst/>
+          </a:prstGeom>
+          <a:noFill/>
+          <a:ln>
+            <a:solidFill>
+              <a:schemeClr val="tx1"/>
+            </a:solidFill>
+          </a:ln>
+        </p:spPr>
+        <p:style>
+          <a:lnRef idx="2">
+            <a:schemeClr val="accent1">
+              <a:shade val="50000"/>
+            </a:schemeClr>
+          </a:lnRef>
+          <a:fillRef idx="1">
+            <a:schemeClr val="accent1"/>
+          </a:fillRef>
+          <a:effectRef idx="0">
+            <a:schemeClr val="accent1"/>
+          </a:effectRef>
+          <a:fontRef idx="minor">
+            <a:schemeClr val="lt1"/>
+          </a:fontRef>
+        </p:style>
+        <p:txBody>
+          <a:bodyPr rot="0" spcFirstLastPara="0" vertOverflow="overflow" horzOverflow="overflow" vert="horz" wrap="square" lIns="116586" tIns="58293" rIns="116586" bIns="58293" numCol="1" spcCol="0" rtlCol="0" fromWordArt="0" anchor="ctr" anchorCtr="0" forceAA="0" compatLnSpc="1">
+            <a:prstTxWarp prst="textNoShape">
+              <a:avLst/>
+            </a:prstTxWarp>
+            <a:noAutofit/>
+          </a:bodyPr>
+          <a:lstStyle/>
+          <a:p>
+            <a:pPr algn="ctr"/>
+            <a:r>
+              <a:rPr lang="en-US" sz="2400" dirty="0">
+                <a:solidFill>
+                  <a:schemeClr val="tx1"/>
+                </a:solidFill>
+              </a:rPr>
+              <a:t>Transmission potential</a:t>
+            </a:r>
+          </a:p>
+        </p:txBody>
+      </p:sp>
+      <p:sp>
+        <p:nvSpPr>
+          <p:cNvPr id="9" name="TextBox 8">
+            <a:extLst>
+              <a:ext uri="{FF2B5EF4-FFF2-40B4-BE49-F238E27FC236}">
+                <a16:creationId xmlns:a16="http://schemas.microsoft.com/office/drawing/2014/main" id="{95234FDC-75D7-4CFF-8DD2-3A5ADC1E675B}"/>
+              </a:ext>
+            </a:extLst>
+          </p:cNvPr>
+          <p:cNvSpPr txBox="1"/>
+          <p:nvPr/>
+        </p:nvSpPr>
+        <p:spPr>
+          <a:xfrm>
+            <a:off x="6310392" y="2748915"/>
+            <a:ext cx="1821717" cy="461665"/>
           </a:xfrm>
           <a:prstGeom prst="rect">
             <a:avLst/>
           </a:prstGeom>
-        </p:spPr>
-      </p:pic>
+          <a:noFill/>
+        </p:spPr>
+        <p:txBody>
+          <a:bodyPr wrap="none" rtlCol="0">
+            <a:spAutoFit/>
+          </a:bodyPr>
+          <a:lstStyle/>
+          <a:p>
+            <a:r>
+              <a:rPr lang="en-US" sz="2400" b="1" u="sng" dirty="0"/>
+              <a:t>Temperature</a:t>
+            </a:r>
+          </a:p>
+        </p:txBody>
+      </p:sp>
+      <p:sp>
+        <p:nvSpPr>
+          <p:cNvPr id="10" name="TextBox 9">
+            <a:extLst>
+              <a:ext uri="{FF2B5EF4-FFF2-40B4-BE49-F238E27FC236}">
+                <a16:creationId xmlns:a16="http://schemas.microsoft.com/office/drawing/2014/main" id="{B3119737-5708-436A-9DC7-A7DB8344133B}"/>
+              </a:ext>
+            </a:extLst>
+          </p:cNvPr>
+          <p:cNvSpPr txBox="1"/>
+          <p:nvPr/>
+        </p:nvSpPr>
+        <p:spPr>
+          <a:xfrm>
+            <a:off x="6348411" y="3290175"/>
+            <a:ext cx="2914709" cy="461665"/>
+          </a:xfrm>
+          <a:prstGeom prst="rect">
+            <a:avLst/>
+          </a:prstGeom>
+          <a:noFill/>
+        </p:spPr>
+        <p:txBody>
+          <a:bodyPr wrap="none" rtlCol="0">
+            <a:spAutoFit/>
+          </a:bodyPr>
+          <a:lstStyle/>
+          <a:p>
+            <a:r>
+              <a:rPr lang="en-US" sz="2400" b="1" u="sng" dirty="0"/>
+              <a:t>Vertebrate host traits</a:t>
+            </a:r>
+          </a:p>
+        </p:txBody>
+      </p:sp>
+      <p:sp>
+        <p:nvSpPr>
+          <p:cNvPr id="11" name="TextBox 10">
+            <a:extLst>
+              <a:ext uri="{FF2B5EF4-FFF2-40B4-BE49-F238E27FC236}">
+                <a16:creationId xmlns:a16="http://schemas.microsoft.com/office/drawing/2014/main" id="{87A26AD2-CD91-4D63-9D16-01B1AA838433}"/>
+              </a:ext>
+            </a:extLst>
+          </p:cNvPr>
+          <p:cNvSpPr txBox="1"/>
+          <p:nvPr/>
+        </p:nvSpPr>
+        <p:spPr>
+          <a:xfrm>
+            <a:off x="2435518" y="501713"/>
+            <a:ext cx="1690399" cy="461665"/>
+          </a:xfrm>
+          <a:prstGeom prst="rect">
+            <a:avLst/>
+          </a:prstGeom>
+          <a:noFill/>
+        </p:spPr>
+        <p:txBody>
+          <a:bodyPr wrap="none" rtlCol="0">
+            <a:spAutoFit/>
+          </a:bodyPr>
+          <a:lstStyle/>
+          <a:p>
+            <a:r>
+              <a:rPr lang="en-US" sz="2400" b="1" u="sng" dirty="0"/>
+              <a:t>Uncertainty</a:t>
+            </a:r>
+          </a:p>
+        </p:txBody>
+      </p:sp>
+      <p:sp>
+        <p:nvSpPr>
+          <p:cNvPr id="12" name="TextBox 11">
+            <a:extLst>
+              <a:ext uri="{FF2B5EF4-FFF2-40B4-BE49-F238E27FC236}">
+                <a16:creationId xmlns:a16="http://schemas.microsoft.com/office/drawing/2014/main" id="{E77E2CE8-A5C3-4A8A-9BAD-B72A02D0D5C0}"/>
+              </a:ext>
+            </a:extLst>
+          </p:cNvPr>
+          <p:cNvSpPr txBox="1"/>
+          <p:nvPr/>
+        </p:nvSpPr>
+        <p:spPr>
+          <a:xfrm>
+            <a:off x="2435518" y="16965"/>
+            <a:ext cx="1222707" cy="461665"/>
+          </a:xfrm>
+          <a:prstGeom prst="rect">
+            <a:avLst/>
+          </a:prstGeom>
+          <a:noFill/>
+        </p:spPr>
+        <p:txBody>
+          <a:bodyPr wrap="none" rtlCol="0">
+            <a:spAutoFit/>
+          </a:bodyPr>
+          <a:lstStyle/>
+          <a:p>
+            <a:r>
+              <a:rPr lang="en-US" sz="2400" b="1" u="sng" dirty="0"/>
+              <a:t>Systems</a:t>
+            </a:r>
+          </a:p>
+        </p:txBody>
+      </p:sp>
+      <p:sp>
+        <p:nvSpPr>
+          <p:cNvPr id="18" name="TextBox 17">
+            <a:extLst>
+              <a:ext uri="{FF2B5EF4-FFF2-40B4-BE49-F238E27FC236}">
+                <a16:creationId xmlns:a16="http://schemas.microsoft.com/office/drawing/2014/main" id="{AF7BA02E-58F6-4D97-9C01-712D4A055B47}"/>
+              </a:ext>
+            </a:extLst>
+          </p:cNvPr>
+          <p:cNvSpPr txBox="1"/>
+          <p:nvPr/>
+        </p:nvSpPr>
+        <p:spPr>
+          <a:xfrm>
+            <a:off x="8891426" y="4939380"/>
+            <a:ext cx="1529831" cy="830997"/>
+          </a:xfrm>
+          <a:prstGeom prst="rect">
+            <a:avLst/>
+          </a:prstGeom>
+          <a:noFill/>
+        </p:spPr>
+        <p:txBody>
+          <a:bodyPr wrap="square" rtlCol="0">
+            <a:spAutoFit/>
+          </a:bodyPr>
+          <a:lstStyle/>
+          <a:p>
+            <a:r>
+              <a:rPr lang="en-US" sz="2400" dirty="0"/>
+              <a:t>Sensitivity analysis</a:t>
+            </a:r>
+            <a:endParaRPr lang="en-US" sz="2400" b="1" u="sng" dirty="0"/>
+          </a:p>
+        </p:txBody>
+      </p:sp>
+      <p:cxnSp>
+        <p:nvCxnSpPr>
+          <p:cNvPr id="19" name="Straight Arrow Connector 18">
+            <a:extLst>
+              <a:ext uri="{FF2B5EF4-FFF2-40B4-BE49-F238E27FC236}">
+                <a16:creationId xmlns:a16="http://schemas.microsoft.com/office/drawing/2014/main" id="{9B7A3E02-3A1F-477D-BC12-0159BDEA550C}"/>
+              </a:ext>
+            </a:extLst>
+          </p:cNvPr>
+          <p:cNvCxnSpPr>
+            <a:cxnSpLocks/>
+            <a:stCxn id="4" idx="2"/>
+            <a:endCxn id="5" idx="1"/>
+          </p:cNvCxnSpPr>
+          <p:nvPr/>
+        </p:nvCxnSpPr>
+        <p:spPr>
+          <a:xfrm>
+            <a:off x="1143000" y="1018283"/>
+            <a:ext cx="605452" cy="887221"/>
+          </a:xfrm>
+          <a:prstGeom prst="straightConnector1">
+            <a:avLst/>
+          </a:prstGeom>
+          <a:ln w="38100">
+            <a:solidFill>
+              <a:schemeClr val="tx1"/>
+            </a:solidFill>
+            <a:tailEnd type="triangle"/>
+          </a:ln>
+        </p:spPr>
+        <p:style>
+          <a:lnRef idx="1">
+            <a:schemeClr val="accent1"/>
+          </a:lnRef>
+          <a:fillRef idx="0">
+            <a:schemeClr val="accent1"/>
+          </a:fillRef>
+          <a:effectRef idx="0">
+            <a:schemeClr val="accent1"/>
+          </a:effectRef>
+          <a:fontRef idx="minor">
+            <a:schemeClr val="tx1"/>
+          </a:fontRef>
+        </p:style>
+      </p:cxnSp>
+      <p:cxnSp>
+        <p:nvCxnSpPr>
+          <p:cNvPr id="20" name="Straight Arrow Connector 19">
+            <a:extLst>
+              <a:ext uri="{FF2B5EF4-FFF2-40B4-BE49-F238E27FC236}">
+                <a16:creationId xmlns:a16="http://schemas.microsoft.com/office/drawing/2014/main" id="{2ED5E13B-1E1F-4227-B1A2-680EFB01008B}"/>
+              </a:ext>
+            </a:extLst>
+          </p:cNvPr>
+          <p:cNvCxnSpPr>
+            <a:cxnSpLocks/>
+            <a:stCxn id="5" idx="2"/>
+            <a:endCxn id="6" idx="1"/>
+          </p:cNvCxnSpPr>
+          <p:nvPr/>
+        </p:nvCxnSpPr>
+        <p:spPr>
+          <a:xfrm>
+            <a:off x="2891452" y="2413336"/>
+            <a:ext cx="1035878" cy="876839"/>
+          </a:xfrm>
+          <a:prstGeom prst="straightConnector1">
+            <a:avLst/>
+          </a:prstGeom>
+          <a:ln w="38100">
+            <a:solidFill>
+              <a:schemeClr val="tx1"/>
+            </a:solidFill>
+            <a:tailEnd type="triangle"/>
+          </a:ln>
+        </p:spPr>
+        <p:style>
+          <a:lnRef idx="1">
+            <a:schemeClr val="accent1"/>
+          </a:lnRef>
+          <a:fillRef idx="0">
+            <a:schemeClr val="accent1"/>
+          </a:fillRef>
+          <a:effectRef idx="0">
+            <a:schemeClr val="accent1"/>
+          </a:effectRef>
+          <a:fontRef idx="minor">
+            <a:schemeClr val="tx1"/>
+          </a:fontRef>
+        </p:style>
+      </p:cxnSp>
+      <p:cxnSp>
+        <p:nvCxnSpPr>
+          <p:cNvPr id="21" name="Straight Arrow Connector 20">
+            <a:extLst>
+              <a:ext uri="{FF2B5EF4-FFF2-40B4-BE49-F238E27FC236}">
+                <a16:creationId xmlns:a16="http://schemas.microsoft.com/office/drawing/2014/main" id="{CD7E8885-9D7E-4D70-815A-2173924C035B}"/>
+              </a:ext>
+            </a:extLst>
+          </p:cNvPr>
+          <p:cNvCxnSpPr>
+            <a:cxnSpLocks/>
+            <a:stCxn id="6" idx="2"/>
+            <a:endCxn id="7" idx="1"/>
+          </p:cNvCxnSpPr>
+          <p:nvPr/>
+        </p:nvCxnSpPr>
+        <p:spPr>
+          <a:xfrm>
+            <a:off x="5070330" y="3798007"/>
+            <a:ext cx="1025670" cy="876839"/>
+          </a:xfrm>
+          <a:prstGeom prst="straightConnector1">
+            <a:avLst/>
+          </a:prstGeom>
+          <a:ln w="38100">
+            <a:solidFill>
+              <a:schemeClr val="tx1"/>
+            </a:solidFill>
+            <a:tailEnd type="triangle"/>
+          </a:ln>
+        </p:spPr>
+        <p:style>
+          <a:lnRef idx="1">
+            <a:schemeClr val="accent1"/>
+          </a:lnRef>
+          <a:fillRef idx="0">
+            <a:schemeClr val="accent1"/>
+          </a:fillRef>
+          <a:effectRef idx="0">
+            <a:schemeClr val="accent1"/>
+          </a:effectRef>
+          <a:fontRef idx="minor">
+            <a:schemeClr val="tx1"/>
+          </a:fontRef>
+        </p:style>
+      </p:cxnSp>
+      <p:cxnSp>
+        <p:nvCxnSpPr>
+          <p:cNvPr id="22" name="Straight Arrow Connector 21">
+            <a:extLst>
+              <a:ext uri="{FF2B5EF4-FFF2-40B4-BE49-F238E27FC236}">
+                <a16:creationId xmlns:a16="http://schemas.microsoft.com/office/drawing/2014/main" id="{0AA109FF-2D21-4328-B881-F8D1B75E4D63}"/>
+              </a:ext>
+            </a:extLst>
+          </p:cNvPr>
+          <p:cNvCxnSpPr>
+            <a:cxnSpLocks/>
+            <a:stCxn id="7" idx="2"/>
+            <a:endCxn id="8" idx="1"/>
+          </p:cNvCxnSpPr>
+          <p:nvPr/>
+        </p:nvCxnSpPr>
+        <p:spPr>
+          <a:xfrm>
+            <a:off x="7239000" y="5182678"/>
+            <a:ext cx="1143000" cy="1166856"/>
+          </a:xfrm>
+          <a:prstGeom prst="straightConnector1">
+            <a:avLst/>
+          </a:prstGeom>
+          <a:ln w="38100">
+            <a:solidFill>
+              <a:schemeClr val="tx1"/>
+            </a:solidFill>
+            <a:tailEnd type="triangle"/>
+          </a:ln>
+        </p:spPr>
+        <p:style>
+          <a:lnRef idx="1">
+            <a:schemeClr val="accent1"/>
+          </a:lnRef>
+          <a:fillRef idx="0">
+            <a:schemeClr val="accent1"/>
+          </a:fillRef>
+          <a:effectRef idx="0">
+            <a:schemeClr val="accent1"/>
+          </a:effectRef>
+          <a:fontRef idx="minor">
+            <a:schemeClr val="tx1"/>
+          </a:fontRef>
+        </p:style>
+      </p:cxnSp>
+      <p:cxnSp>
+        <p:nvCxnSpPr>
+          <p:cNvPr id="23" name="Connector: Elbow 22">
+            <a:extLst>
+              <a:ext uri="{FF2B5EF4-FFF2-40B4-BE49-F238E27FC236}">
+                <a16:creationId xmlns:a16="http://schemas.microsoft.com/office/drawing/2014/main" id="{410B9544-CDD8-4F93-B139-AE923ADE8A6E}"/>
+              </a:ext>
+            </a:extLst>
+          </p:cNvPr>
+          <p:cNvCxnSpPr>
+            <a:cxnSpLocks/>
+            <a:stCxn id="11" idx="3"/>
+            <a:endCxn id="18" idx="0"/>
+          </p:cNvCxnSpPr>
+          <p:nvPr/>
+        </p:nvCxnSpPr>
+        <p:spPr>
+          <a:xfrm>
+            <a:off x="4125917" y="732546"/>
+            <a:ext cx="5530425" cy="4206834"/>
+          </a:xfrm>
+          <a:prstGeom prst="bentConnector2">
+            <a:avLst/>
+          </a:prstGeom>
+          <a:ln w="12700">
+            <a:solidFill>
+              <a:schemeClr val="tx1"/>
+            </a:solidFill>
+            <a:prstDash val="sysDash"/>
+            <a:tailEnd type="triangle" w="lg" len="lg"/>
+          </a:ln>
+        </p:spPr>
+        <p:style>
+          <a:lnRef idx="1">
+            <a:schemeClr val="accent1"/>
+          </a:lnRef>
+          <a:fillRef idx="0">
+            <a:schemeClr val="accent1"/>
+          </a:fillRef>
+          <a:effectRef idx="0">
+            <a:schemeClr val="accent1"/>
+          </a:effectRef>
+          <a:fontRef idx="minor">
+            <a:schemeClr val="tx1"/>
+          </a:fontRef>
+        </p:style>
+      </p:cxnSp>
+      <p:sp>
+        <p:nvSpPr>
+          <p:cNvPr id="24" name="TextBox 23">
+            <a:extLst>
+              <a:ext uri="{FF2B5EF4-FFF2-40B4-BE49-F238E27FC236}">
+                <a16:creationId xmlns:a16="http://schemas.microsoft.com/office/drawing/2014/main" id="{A702F366-F713-4AB6-ADE4-E0A9C736C918}"/>
+              </a:ext>
+            </a:extLst>
+          </p:cNvPr>
+          <p:cNvSpPr txBox="1"/>
+          <p:nvPr/>
+        </p:nvSpPr>
+        <p:spPr>
+          <a:xfrm>
+            <a:off x="4972871" y="-71179"/>
+            <a:ext cx="2480917" cy="461665"/>
+          </a:xfrm>
+          <a:prstGeom prst="rect">
+            <a:avLst/>
+          </a:prstGeom>
+          <a:noFill/>
+        </p:spPr>
+        <p:txBody>
+          <a:bodyPr wrap="square" rtlCol="0">
+            <a:spAutoFit/>
+          </a:bodyPr>
+          <a:lstStyle/>
+          <a:p>
+            <a:r>
+              <a:rPr lang="en-US" sz="2400" b="1" u="sng" dirty="0"/>
+              <a:t>Axes of variation</a:t>
+            </a:r>
+          </a:p>
+        </p:txBody>
+      </p:sp>
     </p:spTree>
     <p:extLst>
       <p:ext uri="{BB962C8B-B14F-4D97-AF65-F5344CB8AC3E}">
-        <p14:creationId xmlns:p14="http://schemas.microsoft.com/office/powerpoint/2010/main" val="2489783504"/>
+        <p14:creationId xmlns:p14="http://schemas.microsoft.com/office/powerpoint/2010/main" val="941704522"/>
       </p:ext>
     </p:extLst>
   </p:cSld>
@@ -3539,10 +5419,10 @@
       </p:grpSpPr>
       <p:pic>
         <p:nvPicPr>
-          <p:cNvPr id="3" name="Picture 2">
-            <a:extLst>
-              <a:ext uri="{FF2B5EF4-FFF2-40B4-BE49-F238E27FC236}">
-                <a16:creationId xmlns:a16="http://schemas.microsoft.com/office/drawing/2014/main" id="{1ED4882C-C5E1-4EB9-9108-06FC8DF98F08}"/>
+          <p:cNvPr id="4" name="Picture 3">
+            <a:extLst>
+              <a:ext uri="{FF2B5EF4-FFF2-40B4-BE49-F238E27FC236}">
+                <a16:creationId xmlns:a16="http://schemas.microsoft.com/office/drawing/2014/main" id="{771AC047-6EA2-4962-8437-05B71B23862F}"/>
               </a:ext>
             </a:extLst>
           </p:cNvPr>
@@ -3565,7 +5445,7 @@
         </p:blipFill>
         <p:spPr>
           <a:xfrm>
-            <a:off x="0" y="200025"/>
+            <a:off x="0" y="400050"/>
             <a:ext cx="12192000" cy="6457950"/>
           </a:xfrm>
           <a:prstGeom prst="rect">
@@ -3573,10 +5453,54 @@
           </a:prstGeom>
         </p:spPr>
       </p:pic>
+      <p:sp>
+        <p:nvSpPr>
+          <p:cNvPr id="5" name="Title 4">
+            <a:extLst>
+              <a:ext uri="{FF2B5EF4-FFF2-40B4-BE49-F238E27FC236}">
+                <a16:creationId xmlns:a16="http://schemas.microsoft.com/office/drawing/2014/main" id="{D3598150-473F-4BA0-AC49-10E90924829F}"/>
+              </a:ext>
+            </a:extLst>
+          </p:cNvPr>
+          <p:cNvSpPr>
+            <a:spLocks noGrp="1"/>
+          </p:cNvSpPr>
+          <p:nvPr>
+            <p:ph type="title"/>
+          </p:nvPr>
+        </p:nvSpPr>
+        <p:spPr>
+          <a:xfrm>
+            <a:off x="838200" y="1"/>
+            <a:ext cx="10515600" cy="400050"/>
+          </a:xfrm>
+        </p:spPr>
+        <p:txBody>
+          <a:bodyPr>
+            <a:noAutofit/>
+          </a:bodyPr>
+          <a:lstStyle/>
+          <a:p>
+            <a:pPr algn="ctr"/>
+            <a:r>
+              <a:rPr lang="en-US" sz="3200" b="1" u="sng" dirty="0"/>
+              <a:t>Step 1</a:t>
+            </a:r>
+            <a:r>
+              <a:rPr lang="en-US" sz="3200" b="1" dirty="0"/>
+              <a:t>: </a:t>
+            </a:r>
+            <a:r>
+              <a:rPr lang="en-US" sz="3200" dirty="0"/>
+              <a:t>All trait data</a:t>
+            </a:r>
+          </a:p>
+        </p:txBody>
+      </p:sp>
     </p:spTree>
     <p:extLst>
       <p:ext uri="{BB962C8B-B14F-4D97-AF65-F5344CB8AC3E}">
-        <p14:creationId xmlns:p14="http://schemas.microsoft.com/office/powerpoint/2010/main" val="3546353873"/>
+        <p14:creationId xmlns:p14="http://schemas.microsoft.com/office/powerpoint/2010/main" val="2489783504"/>
       </p:ext>
     </p:extLst>
   </p:cSld>
@@ -3603,10 +5527,530 @@
           <a:chExt cx="0" cy="0"/>
         </a:xfrm>
       </p:grpSpPr>
+      <p:pic>
+        <p:nvPicPr>
+          <p:cNvPr id="4" name="Picture 3">
+            <a:extLst>
+              <a:ext uri="{FF2B5EF4-FFF2-40B4-BE49-F238E27FC236}">
+                <a16:creationId xmlns:a16="http://schemas.microsoft.com/office/drawing/2014/main" id="{771AC047-6EA2-4962-8437-05B71B23862F}"/>
+              </a:ext>
+            </a:extLst>
+          </p:cNvPr>
+          <p:cNvPicPr>
+            <a:picLocks noChangeAspect="1"/>
+          </p:cNvPicPr>
+          <p:nvPr/>
+        </p:nvPicPr>
+        <p:blipFill>
+          <a:blip r:embed="rId2">
+            <a:extLst>
+              <a:ext uri="{28A0092B-C50C-407E-A947-70E740481C1C}">
+                <a14:useLocalDpi xmlns:a14="http://schemas.microsoft.com/office/drawing/2010/main" val="0"/>
+              </a:ext>
+            </a:extLst>
+          </a:blip>
+          <a:stretch>
+            <a:fillRect/>
+          </a:stretch>
+        </p:blipFill>
+        <p:spPr>
+          <a:xfrm>
+            <a:off x="0" y="400050"/>
+            <a:ext cx="12191999" cy="6457950"/>
+          </a:xfrm>
+          <a:prstGeom prst="rect">
+            <a:avLst/>
+          </a:prstGeom>
+        </p:spPr>
+      </p:pic>
+      <p:sp>
+        <p:nvSpPr>
+          <p:cNvPr id="5" name="Title 4">
+            <a:extLst>
+              <a:ext uri="{FF2B5EF4-FFF2-40B4-BE49-F238E27FC236}">
+                <a16:creationId xmlns:a16="http://schemas.microsoft.com/office/drawing/2014/main" id="{D3598150-473F-4BA0-AC49-10E90924829F}"/>
+              </a:ext>
+            </a:extLst>
+          </p:cNvPr>
+          <p:cNvSpPr>
+            <a:spLocks noGrp="1"/>
+          </p:cNvSpPr>
+          <p:nvPr>
+            <p:ph type="title"/>
+          </p:nvPr>
+        </p:nvSpPr>
+        <p:spPr>
+          <a:xfrm>
+            <a:off x="838200" y="1"/>
+            <a:ext cx="10515600" cy="400050"/>
+          </a:xfrm>
+        </p:spPr>
+        <p:txBody>
+          <a:bodyPr>
+            <a:noAutofit/>
+          </a:bodyPr>
+          <a:lstStyle/>
+          <a:p>
+            <a:pPr algn="ctr"/>
+            <a:r>
+              <a:rPr lang="en-US" sz="3200" b="1" u="sng" dirty="0"/>
+              <a:t>Step 1</a:t>
+            </a:r>
+            <a:r>
+              <a:rPr lang="en-US" sz="3200" b="1" dirty="0"/>
+              <a:t>: </a:t>
+            </a:r>
+            <a:r>
+              <a:rPr lang="en-US" sz="3200" dirty="0"/>
+              <a:t>Focal systems trait data</a:t>
+            </a:r>
+          </a:p>
+        </p:txBody>
+      </p:sp>
     </p:spTree>
     <p:extLst>
       <p:ext uri="{BB962C8B-B14F-4D97-AF65-F5344CB8AC3E}">
-        <p14:creationId xmlns:p14="http://schemas.microsoft.com/office/powerpoint/2010/main" val="2655669551"/>
+        <p14:creationId xmlns:p14="http://schemas.microsoft.com/office/powerpoint/2010/main" val="1012773398"/>
+      </p:ext>
+    </p:extLst>
+  </p:cSld>
+  <p:clrMapOvr>
+    <a:masterClrMapping/>
+  </p:clrMapOvr>
+</p:sld>
+</file>
+
+<file path=ppt/slides/slide6.xml><?xml version="1.0" encoding="utf-8"?>
+<p:sld xmlns:a="http://schemas.openxmlformats.org/drawingml/2006/main" xmlns:r="http://schemas.openxmlformats.org/officeDocument/2006/relationships" xmlns:p="http://schemas.openxmlformats.org/presentationml/2006/main">
+  <p:cSld>
+    <p:spTree>
+      <p:nvGrpSpPr>
+        <p:cNvPr id="1" name=""/>
+        <p:cNvGrpSpPr/>
+        <p:nvPr/>
+      </p:nvGrpSpPr>
+      <p:grpSpPr>
+        <a:xfrm>
+          <a:off x="0" y="0"/>
+          <a:ext cx="0" cy="0"/>
+          <a:chOff x="0" y="0"/>
+          <a:chExt cx="0" cy="0"/>
+        </a:xfrm>
+      </p:grpSpPr>
+      <p:pic>
+        <p:nvPicPr>
+          <p:cNvPr id="4" name="Picture 3">
+            <a:extLst>
+              <a:ext uri="{FF2B5EF4-FFF2-40B4-BE49-F238E27FC236}">
+                <a16:creationId xmlns:a16="http://schemas.microsoft.com/office/drawing/2014/main" id="{771AC047-6EA2-4962-8437-05B71B23862F}"/>
+              </a:ext>
+            </a:extLst>
+          </p:cNvPr>
+          <p:cNvPicPr>
+            <a:picLocks noChangeAspect="1"/>
+          </p:cNvPicPr>
+          <p:nvPr/>
+        </p:nvPicPr>
+        <p:blipFill>
+          <a:blip r:embed="rId2">
+            <a:extLst>
+              <a:ext uri="{28A0092B-C50C-407E-A947-70E740481C1C}">
+                <a14:useLocalDpi xmlns:a14="http://schemas.microsoft.com/office/drawing/2010/main" val="0"/>
+              </a:ext>
+            </a:extLst>
+          </a:blip>
+          <a:stretch>
+            <a:fillRect/>
+          </a:stretch>
+        </p:blipFill>
+        <p:spPr>
+          <a:xfrm>
+            <a:off x="0" y="400050"/>
+            <a:ext cx="12191999" cy="6457949"/>
+          </a:xfrm>
+          <a:prstGeom prst="rect">
+            <a:avLst/>
+          </a:prstGeom>
+        </p:spPr>
+      </p:pic>
+      <p:sp>
+        <p:nvSpPr>
+          <p:cNvPr id="5" name="Title 4">
+            <a:extLst>
+              <a:ext uri="{FF2B5EF4-FFF2-40B4-BE49-F238E27FC236}">
+                <a16:creationId xmlns:a16="http://schemas.microsoft.com/office/drawing/2014/main" id="{D3598150-473F-4BA0-AC49-10E90924829F}"/>
+              </a:ext>
+            </a:extLst>
+          </p:cNvPr>
+          <p:cNvSpPr>
+            <a:spLocks noGrp="1"/>
+          </p:cNvSpPr>
+          <p:nvPr>
+            <p:ph type="title"/>
+          </p:nvPr>
+        </p:nvSpPr>
+        <p:spPr>
+          <a:xfrm>
+            <a:off x="838200" y="1"/>
+            <a:ext cx="10515600" cy="400050"/>
+          </a:xfrm>
+        </p:spPr>
+        <p:txBody>
+          <a:bodyPr>
+            <a:noAutofit/>
+          </a:bodyPr>
+          <a:lstStyle/>
+          <a:p>
+            <a:pPr algn="ctr"/>
+            <a:r>
+              <a:rPr lang="en-US" sz="3200" b="1" u="sng" dirty="0"/>
+              <a:t>Step 2</a:t>
+            </a:r>
+            <a:r>
+              <a:rPr lang="en-US" sz="3200" b="1" dirty="0"/>
+              <a:t>: </a:t>
+            </a:r>
+            <a:r>
+              <a:rPr lang="en-US" sz="3200" dirty="0"/>
+              <a:t>All TPC parameter distributions</a:t>
+            </a:r>
+          </a:p>
+        </p:txBody>
+      </p:sp>
+    </p:spTree>
+    <p:extLst>
+      <p:ext uri="{BB962C8B-B14F-4D97-AF65-F5344CB8AC3E}">
+        <p14:creationId xmlns:p14="http://schemas.microsoft.com/office/powerpoint/2010/main" val="1152337699"/>
+      </p:ext>
+    </p:extLst>
+  </p:cSld>
+  <p:clrMapOvr>
+    <a:masterClrMapping/>
+  </p:clrMapOvr>
+</p:sld>
+</file>
+
+<file path=ppt/slides/slide7.xml><?xml version="1.0" encoding="utf-8"?>
+<p:sld xmlns:a="http://schemas.openxmlformats.org/drawingml/2006/main" xmlns:r="http://schemas.openxmlformats.org/officeDocument/2006/relationships" xmlns:p="http://schemas.openxmlformats.org/presentationml/2006/main">
+  <p:cSld>
+    <p:spTree>
+      <p:nvGrpSpPr>
+        <p:cNvPr id="1" name=""/>
+        <p:cNvGrpSpPr/>
+        <p:nvPr/>
+      </p:nvGrpSpPr>
+      <p:grpSpPr>
+        <a:xfrm>
+          <a:off x="0" y="0"/>
+          <a:ext cx="0" cy="0"/>
+          <a:chOff x="0" y="0"/>
+          <a:chExt cx="0" cy="0"/>
+        </a:xfrm>
+      </p:grpSpPr>
+      <p:pic>
+        <p:nvPicPr>
+          <p:cNvPr id="4" name="Picture 3">
+            <a:extLst>
+              <a:ext uri="{FF2B5EF4-FFF2-40B4-BE49-F238E27FC236}">
+                <a16:creationId xmlns:a16="http://schemas.microsoft.com/office/drawing/2014/main" id="{771AC047-6EA2-4962-8437-05B71B23862F}"/>
+              </a:ext>
+            </a:extLst>
+          </p:cNvPr>
+          <p:cNvPicPr>
+            <a:picLocks noChangeAspect="1"/>
+          </p:cNvPicPr>
+          <p:nvPr/>
+        </p:nvPicPr>
+        <p:blipFill>
+          <a:blip r:embed="rId2">
+            <a:extLst>
+              <a:ext uri="{28A0092B-C50C-407E-A947-70E740481C1C}">
+                <a14:useLocalDpi xmlns:a14="http://schemas.microsoft.com/office/drawing/2010/main" val="0"/>
+              </a:ext>
+            </a:extLst>
+          </a:blip>
+          <a:stretch>
+            <a:fillRect/>
+          </a:stretch>
+        </p:blipFill>
+        <p:spPr>
+          <a:xfrm>
+            <a:off x="1" y="400050"/>
+            <a:ext cx="12191997" cy="6457949"/>
+          </a:xfrm>
+          <a:prstGeom prst="rect">
+            <a:avLst/>
+          </a:prstGeom>
+        </p:spPr>
+      </p:pic>
+      <p:sp>
+        <p:nvSpPr>
+          <p:cNvPr id="5" name="Title 4">
+            <a:extLst>
+              <a:ext uri="{FF2B5EF4-FFF2-40B4-BE49-F238E27FC236}">
+                <a16:creationId xmlns:a16="http://schemas.microsoft.com/office/drawing/2014/main" id="{D3598150-473F-4BA0-AC49-10E90924829F}"/>
+              </a:ext>
+            </a:extLst>
+          </p:cNvPr>
+          <p:cNvSpPr>
+            <a:spLocks noGrp="1"/>
+          </p:cNvSpPr>
+          <p:nvPr>
+            <p:ph type="title"/>
+          </p:nvPr>
+        </p:nvSpPr>
+        <p:spPr>
+          <a:xfrm>
+            <a:off x="838200" y="1"/>
+            <a:ext cx="10515600" cy="400050"/>
+          </a:xfrm>
+        </p:spPr>
+        <p:txBody>
+          <a:bodyPr>
+            <a:noAutofit/>
+          </a:bodyPr>
+          <a:lstStyle/>
+          <a:p>
+            <a:pPr algn="ctr"/>
+            <a:r>
+              <a:rPr lang="en-US" sz="3200" b="1" u="sng" dirty="0"/>
+              <a:t>Step 2</a:t>
+            </a:r>
+            <a:r>
+              <a:rPr lang="en-US" sz="3200" b="1" dirty="0"/>
+              <a:t>: </a:t>
+            </a:r>
+            <a:r>
+              <a:rPr lang="en-US" sz="3200" dirty="0"/>
+              <a:t>Focal system TPC parameter distributions</a:t>
+            </a:r>
+          </a:p>
+        </p:txBody>
+      </p:sp>
+    </p:spTree>
+    <p:extLst>
+      <p:ext uri="{BB962C8B-B14F-4D97-AF65-F5344CB8AC3E}">
+        <p14:creationId xmlns:p14="http://schemas.microsoft.com/office/powerpoint/2010/main" val="1201261670"/>
+      </p:ext>
+    </p:extLst>
+  </p:cSld>
+  <p:clrMapOvr>
+    <a:masterClrMapping/>
+  </p:clrMapOvr>
+</p:sld>
+</file>
+
+<file path=ppt/slides/slide8.xml><?xml version="1.0" encoding="utf-8"?>
+<p:sld xmlns:a="http://schemas.openxmlformats.org/drawingml/2006/main" xmlns:r="http://schemas.openxmlformats.org/officeDocument/2006/relationships" xmlns:p="http://schemas.openxmlformats.org/presentationml/2006/main">
+  <p:cSld>
+    <p:spTree>
+      <p:nvGrpSpPr>
+        <p:cNvPr id="1" name=""/>
+        <p:cNvGrpSpPr/>
+        <p:nvPr/>
+      </p:nvGrpSpPr>
+      <p:grpSpPr>
+        <a:xfrm>
+          <a:off x="0" y="0"/>
+          <a:ext cx="0" cy="0"/>
+          <a:chOff x="0" y="0"/>
+          <a:chExt cx="0" cy="0"/>
+        </a:xfrm>
+      </p:grpSpPr>
+      <p:pic>
+        <p:nvPicPr>
+          <p:cNvPr id="4" name="Picture 3">
+            <a:extLst>
+              <a:ext uri="{FF2B5EF4-FFF2-40B4-BE49-F238E27FC236}">
+                <a16:creationId xmlns:a16="http://schemas.microsoft.com/office/drawing/2014/main" id="{771AC047-6EA2-4962-8437-05B71B23862F}"/>
+              </a:ext>
+            </a:extLst>
+          </p:cNvPr>
+          <p:cNvPicPr>
+            <a:picLocks noChangeAspect="1"/>
+          </p:cNvPicPr>
+          <p:nvPr/>
+        </p:nvPicPr>
+        <p:blipFill>
+          <a:blip r:embed="rId2">
+            <a:extLst>
+              <a:ext uri="{28A0092B-C50C-407E-A947-70E740481C1C}">
+                <a14:useLocalDpi xmlns:a14="http://schemas.microsoft.com/office/drawing/2010/main" val="0"/>
+              </a:ext>
+            </a:extLst>
+          </a:blip>
+          <a:stretch>
+            <a:fillRect/>
+          </a:stretch>
+        </p:blipFill>
+        <p:spPr>
+          <a:xfrm>
+            <a:off x="1" y="400050"/>
+            <a:ext cx="12191997" cy="6457948"/>
+          </a:xfrm>
+          <a:prstGeom prst="rect">
+            <a:avLst/>
+          </a:prstGeom>
+        </p:spPr>
+      </p:pic>
+      <p:sp>
+        <p:nvSpPr>
+          <p:cNvPr id="5" name="Title 4">
+            <a:extLst>
+              <a:ext uri="{FF2B5EF4-FFF2-40B4-BE49-F238E27FC236}">
+                <a16:creationId xmlns:a16="http://schemas.microsoft.com/office/drawing/2014/main" id="{D3598150-473F-4BA0-AC49-10E90924829F}"/>
+              </a:ext>
+            </a:extLst>
+          </p:cNvPr>
+          <p:cNvSpPr>
+            <a:spLocks noGrp="1"/>
+          </p:cNvSpPr>
+          <p:nvPr>
+            <p:ph type="title"/>
+          </p:nvPr>
+        </p:nvSpPr>
+        <p:spPr>
+          <a:xfrm>
+            <a:off x="838200" y="1"/>
+            <a:ext cx="10515600" cy="400050"/>
+          </a:xfrm>
+        </p:spPr>
+        <p:txBody>
+          <a:bodyPr>
+            <a:noAutofit/>
+          </a:bodyPr>
+          <a:lstStyle/>
+          <a:p>
+            <a:pPr algn="ctr"/>
+            <a:r>
+              <a:rPr lang="en-US" sz="3200" b="1" u="sng" dirty="0"/>
+              <a:t>Step 2</a:t>
+            </a:r>
+            <a:r>
+              <a:rPr lang="en-US" sz="3200" b="1" dirty="0"/>
+              <a:t>: </a:t>
+            </a:r>
+            <a:r>
+              <a:rPr lang="en-US" sz="3200" dirty="0"/>
+              <a:t>All TPC curves</a:t>
+            </a:r>
+          </a:p>
+        </p:txBody>
+      </p:sp>
+    </p:spTree>
+    <p:extLst>
+      <p:ext uri="{BB962C8B-B14F-4D97-AF65-F5344CB8AC3E}">
+        <p14:creationId xmlns:p14="http://schemas.microsoft.com/office/powerpoint/2010/main" val="2602519539"/>
+      </p:ext>
+    </p:extLst>
+  </p:cSld>
+  <p:clrMapOvr>
+    <a:masterClrMapping/>
+  </p:clrMapOvr>
+</p:sld>
+</file>
+
+<file path=ppt/slides/slide9.xml><?xml version="1.0" encoding="utf-8"?>
+<p:sld xmlns:a="http://schemas.openxmlformats.org/drawingml/2006/main" xmlns:r="http://schemas.openxmlformats.org/officeDocument/2006/relationships" xmlns:p="http://schemas.openxmlformats.org/presentationml/2006/main">
+  <p:cSld>
+    <p:spTree>
+      <p:nvGrpSpPr>
+        <p:cNvPr id="1" name=""/>
+        <p:cNvGrpSpPr/>
+        <p:nvPr/>
+      </p:nvGrpSpPr>
+      <p:grpSpPr>
+        <a:xfrm>
+          <a:off x="0" y="0"/>
+          <a:ext cx="0" cy="0"/>
+          <a:chOff x="0" y="0"/>
+          <a:chExt cx="0" cy="0"/>
+        </a:xfrm>
+      </p:grpSpPr>
+      <p:pic>
+        <p:nvPicPr>
+          <p:cNvPr id="4" name="Picture 3">
+            <a:extLst>
+              <a:ext uri="{FF2B5EF4-FFF2-40B4-BE49-F238E27FC236}">
+                <a16:creationId xmlns:a16="http://schemas.microsoft.com/office/drawing/2014/main" id="{771AC047-6EA2-4962-8437-05B71B23862F}"/>
+              </a:ext>
+            </a:extLst>
+          </p:cNvPr>
+          <p:cNvPicPr>
+            <a:picLocks noChangeAspect="1"/>
+          </p:cNvPicPr>
+          <p:nvPr/>
+        </p:nvPicPr>
+        <p:blipFill>
+          <a:blip r:embed="rId2">
+            <a:extLst>
+              <a:ext uri="{28A0092B-C50C-407E-A947-70E740481C1C}">
+                <a14:useLocalDpi xmlns:a14="http://schemas.microsoft.com/office/drawing/2010/main" val="0"/>
+              </a:ext>
+            </a:extLst>
+          </a:blip>
+          <a:stretch>
+            <a:fillRect/>
+          </a:stretch>
+        </p:blipFill>
+        <p:spPr>
+          <a:xfrm>
+            <a:off x="1" y="400050"/>
+            <a:ext cx="12191997" cy="6457948"/>
+          </a:xfrm>
+          <a:prstGeom prst="rect">
+            <a:avLst/>
+          </a:prstGeom>
+        </p:spPr>
+      </p:pic>
+      <p:sp>
+        <p:nvSpPr>
+          <p:cNvPr id="5" name="Title 4">
+            <a:extLst>
+              <a:ext uri="{FF2B5EF4-FFF2-40B4-BE49-F238E27FC236}">
+                <a16:creationId xmlns:a16="http://schemas.microsoft.com/office/drawing/2014/main" id="{D3598150-473F-4BA0-AC49-10E90924829F}"/>
+              </a:ext>
+            </a:extLst>
+          </p:cNvPr>
+          <p:cNvSpPr>
+            <a:spLocks noGrp="1"/>
+          </p:cNvSpPr>
+          <p:nvPr>
+            <p:ph type="title"/>
+          </p:nvPr>
+        </p:nvSpPr>
+        <p:spPr>
+          <a:xfrm>
+            <a:off x="838200" y="1"/>
+            <a:ext cx="10515600" cy="400050"/>
+          </a:xfrm>
+        </p:spPr>
+        <p:txBody>
+          <a:bodyPr>
+            <a:noAutofit/>
+          </a:bodyPr>
+          <a:lstStyle/>
+          <a:p>
+            <a:pPr algn="ctr"/>
+            <a:r>
+              <a:rPr lang="en-US" sz="3200" b="1" u="sng" dirty="0"/>
+              <a:t>Step 2</a:t>
+            </a:r>
+            <a:r>
+              <a:rPr lang="en-US" sz="3200" b="1" dirty="0"/>
+              <a:t>: </a:t>
+            </a:r>
+            <a:r>
+              <a:rPr lang="en-US" sz="3200" dirty="0"/>
+              <a:t>Focal TPC curves</a:t>
+            </a:r>
+          </a:p>
+        </p:txBody>
+      </p:sp>
+    </p:spTree>
+    <p:extLst>
+      <p:ext uri="{BB962C8B-B14F-4D97-AF65-F5344CB8AC3E}">
+        <p14:creationId xmlns:p14="http://schemas.microsoft.com/office/powerpoint/2010/main" val="3255348914"/>
       </p:ext>
     </p:extLst>
   </p:cSld>

</xml_diff>